<commit_message>
Minor updates to Week 2 lecture notes
</commit_message>
<xml_diff>
--- a/Lecture_notes_ppt/GEOG0125 Week 2 Lecture - Bayesian GLMs.pptx
+++ b/Lecture_notes_ppt/GEOG0125 Week 2 Lecture - Bayesian GLMs.pptx
@@ -6,7 +6,7 @@
     <p:sldMasterId id="2147483660" r:id="rId2"/>
   </p:sldMasterIdLst>
   <p:notesMasterIdLst>
-    <p:notesMasterId r:id="rId27"/>
+    <p:notesMasterId r:id="rId28"/>
   </p:notesMasterIdLst>
   <p:sldIdLst>
     <p:sldId id="420" r:id="rId3"/>
@@ -28,11 +28,12 @@
     <p:sldId id="1316" r:id="rId19"/>
     <p:sldId id="1317" r:id="rId20"/>
     <p:sldId id="1318" r:id="rId21"/>
-    <p:sldId id="1319" r:id="rId22"/>
-    <p:sldId id="1322" r:id="rId23"/>
-    <p:sldId id="1323" r:id="rId24"/>
-    <p:sldId id="1321" r:id="rId25"/>
-    <p:sldId id="1301" r:id="rId26"/>
+    <p:sldId id="1324" r:id="rId22"/>
+    <p:sldId id="1319" r:id="rId23"/>
+    <p:sldId id="1322" r:id="rId24"/>
+    <p:sldId id="1323" r:id="rId25"/>
+    <p:sldId id="1321" r:id="rId26"/>
+    <p:sldId id="1301" r:id="rId27"/>
   </p:sldIdLst>
   <p:sldSz cx="12192000" cy="6858000"/>
   <p:notesSz cx="6858000" cy="9144000"/>
@@ -247,7 +248,7 @@
           <a:p>
             <a:fld id="{B189E245-271D-FD48-BFBB-D05CACE4EE11}" type="datetimeFigureOut">
               <a:rPr lang="en-US" smtClean="0"/>
-              <a:t>1/16/24</a:t>
+              <a:t>1/22/25</a:t>
             </a:fld>
             <a:endParaRPr lang="en-US"/>
           </a:p>
@@ -946,6 +947,115 @@
 </p:notes>
 </file>
 
+<file path=ppt/notesSlides/notesSlide14.xml><?xml version="1.0" encoding="utf-8"?>
+<p:notes xmlns:a="http://schemas.openxmlformats.org/drawingml/2006/main" xmlns:r="http://schemas.openxmlformats.org/officeDocument/2006/relationships" xmlns:p="http://schemas.openxmlformats.org/presentationml/2006/main">
+  <p:cSld>
+    <p:spTree>
+      <p:nvGrpSpPr>
+        <p:cNvPr id="1" name="">
+          <a:extLst>
+            <a:ext uri="{FF2B5EF4-FFF2-40B4-BE49-F238E27FC236}">
+              <a16:creationId xmlns:a16="http://schemas.microsoft.com/office/drawing/2014/main" id="{A238E117-339D-9660-C947-D7A019A05C31}"/>
+            </a:ext>
+          </a:extLst>
+        </p:cNvPr>
+        <p:cNvGrpSpPr/>
+        <p:nvPr/>
+      </p:nvGrpSpPr>
+      <p:grpSpPr>
+        <a:xfrm>
+          <a:off x="0" y="0"/>
+          <a:ext cx="0" cy="0"/>
+          <a:chOff x="0" y="0"/>
+          <a:chExt cx="0" cy="0"/>
+        </a:xfrm>
+      </p:grpSpPr>
+      <p:sp>
+        <p:nvSpPr>
+          <p:cNvPr id="2" name="Slide Image Placeholder 1">
+            <a:extLst>
+              <a:ext uri="{FF2B5EF4-FFF2-40B4-BE49-F238E27FC236}">
+                <a16:creationId xmlns:a16="http://schemas.microsoft.com/office/drawing/2014/main" id="{73FF6B91-F0AC-D328-8D07-BF2121B24D17}"/>
+              </a:ext>
+            </a:extLst>
+          </p:cNvPr>
+          <p:cNvSpPr>
+            <a:spLocks noGrp="1" noRot="1" noChangeAspect="1"/>
+          </p:cNvSpPr>
+          <p:nvPr>
+            <p:ph type="sldImg"/>
+          </p:nvPr>
+        </p:nvSpPr>
+        <p:spPr/>
+      </p:sp>
+      <p:sp>
+        <p:nvSpPr>
+          <p:cNvPr id="3" name="Notes Placeholder 2">
+            <a:extLst>
+              <a:ext uri="{FF2B5EF4-FFF2-40B4-BE49-F238E27FC236}">
+                <a16:creationId xmlns:a16="http://schemas.microsoft.com/office/drawing/2014/main" id="{F162C9B2-58C6-92CB-5CBD-F4CA06FAFF23}"/>
+              </a:ext>
+            </a:extLst>
+          </p:cNvPr>
+          <p:cNvSpPr>
+            <a:spLocks noGrp="1"/>
+          </p:cNvSpPr>
+          <p:nvPr>
+            <p:ph type="body" idx="1"/>
+          </p:nvPr>
+        </p:nvSpPr>
+        <p:spPr/>
+        <p:txBody>
+          <a:bodyPr/>
+          <a:lstStyle/>
+          <a:p>
+            <a:endParaRPr lang="en-US" dirty="0"/>
+          </a:p>
+        </p:txBody>
+      </p:sp>
+      <p:sp>
+        <p:nvSpPr>
+          <p:cNvPr id="4" name="Slide Number Placeholder 3">
+            <a:extLst>
+              <a:ext uri="{FF2B5EF4-FFF2-40B4-BE49-F238E27FC236}">
+                <a16:creationId xmlns:a16="http://schemas.microsoft.com/office/drawing/2014/main" id="{8B113E87-B975-138C-1FBF-E6D7AE5CC430}"/>
+              </a:ext>
+            </a:extLst>
+          </p:cNvPr>
+          <p:cNvSpPr>
+            <a:spLocks noGrp="1"/>
+          </p:cNvSpPr>
+          <p:nvPr>
+            <p:ph type="sldNum" sz="quarter" idx="5"/>
+          </p:nvPr>
+        </p:nvSpPr>
+        <p:spPr/>
+        <p:txBody>
+          <a:bodyPr/>
+          <a:lstStyle/>
+          <a:p>
+            <a:fld id="{BC973DE8-1EC7-9C41-B6BA-DB20899CA618}" type="slidenum">
+              <a:rPr lang="en-US" altLang="x-none" smtClean="0"/>
+              <a:pPr/>
+              <a:t>20</a:t>
+            </a:fld>
+            <a:endParaRPr lang="en-US" altLang="x-none"/>
+          </a:p>
+        </p:txBody>
+      </p:sp>
+    </p:spTree>
+    <p:extLst>
+      <p:ext uri="{BB962C8B-B14F-4D97-AF65-F5344CB8AC3E}">
+        <p14:creationId xmlns:p14="http://schemas.microsoft.com/office/powerpoint/2010/main" val="2192685963"/>
+      </p:ext>
+    </p:extLst>
+  </p:cSld>
+  <p:clrMapOvr>
+    <a:masterClrMapping/>
+  </p:clrMapOvr>
+</p:notes>
+</file>
+
 <file path=ppt/notesSlides/notesSlide2.xml><?xml version="1.0" encoding="utf-8"?>
 <p:notes xmlns:a="http://schemas.openxmlformats.org/drawingml/2006/main" xmlns:r="http://schemas.openxmlformats.org/officeDocument/2006/relationships" xmlns:p="http://schemas.openxmlformats.org/presentationml/2006/main">
   <p:cSld>
@@ -1821,7 +1931,7 @@
           <a:p>
             <a:fld id="{2BB000D9-F882-5444-9F67-E68F2BDFFFE1}" type="datetimeFigureOut">
               <a:rPr lang="en-US" smtClean="0"/>
-              <a:t>1/16/24</a:t>
+              <a:t>1/22/25</a:t>
             </a:fld>
             <a:endParaRPr lang="en-US"/>
           </a:p>
@@ -2029,7 +2139,7 @@
           <a:p>
             <a:fld id="{2BB000D9-F882-5444-9F67-E68F2BDFFFE1}" type="datetimeFigureOut">
               <a:rPr lang="en-US" smtClean="0"/>
-              <a:t>1/16/24</a:t>
+              <a:t>1/22/25</a:t>
             </a:fld>
             <a:endParaRPr lang="en-US"/>
           </a:p>
@@ -2447,7 +2557,7 @@
           <a:p>
             <a:fld id="{C21145F5-A5E9-5F43-82CD-3B9BA6E3131E}" type="datetimeFigureOut">
               <a:rPr lang="en-US" smtClean="0"/>
-              <a:t>1/16/24</a:t>
+              <a:t>1/22/25</a:t>
             </a:fld>
             <a:endParaRPr lang="en-US"/>
           </a:p>
@@ -2655,7 +2765,7 @@
           <a:p>
             <a:fld id="{C21145F5-A5E9-5F43-82CD-3B9BA6E3131E}" type="datetimeFigureOut">
               <a:rPr lang="en-US" smtClean="0"/>
-              <a:t>1/16/24</a:t>
+              <a:t>1/22/25</a:t>
             </a:fld>
             <a:endParaRPr lang="en-US"/>
           </a:p>
@@ -2930,7 +3040,7 @@
           <a:p>
             <a:fld id="{C21145F5-A5E9-5F43-82CD-3B9BA6E3131E}" type="datetimeFigureOut">
               <a:rPr lang="en-US" smtClean="0"/>
-              <a:t>1/16/24</a:t>
+              <a:t>1/22/25</a:t>
             </a:fld>
             <a:endParaRPr lang="en-US"/>
           </a:p>
@@ -3197,7 +3307,7 @@
           <a:p>
             <a:fld id="{C21145F5-A5E9-5F43-82CD-3B9BA6E3131E}" type="datetimeFigureOut">
               <a:rPr lang="en-US" smtClean="0"/>
-              <a:t>1/16/24</a:t>
+              <a:t>1/22/25</a:t>
             </a:fld>
             <a:endParaRPr lang="en-US"/>
           </a:p>
@@ -3600,7 +3710,7 @@
           <a:p>
             <a:fld id="{C21145F5-A5E9-5F43-82CD-3B9BA6E3131E}" type="datetimeFigureOut">
               <a:rPr lang="en-US" smtClean="0"/>
-              <a:t>1/16/24</a:t>
+              <a:t>1/22/25</a:t>
             </a:fld>
             <a:endParaRPr lang="en-US"/>
           </a:p>
@@ -3779,7 +3889,7 @@
           <a:p>
             <a:fld id="{C21145F5-A5E9-5F43-82CD-3B9BA6E3131E}" type="datetimeFigureOut">
               <a:rPr lang="en-US" smtClean="0"/>
-              <a:t>1/16/24</a:t>
+              <a:t>1/22/25</a:t>
             </a:fld>
             <a:endParaRPr lang="en-US"/>
           </a:p>
@@ -3898,7 +4008,7 @@
           <a:p>
             <a:fld id="{C21145F5-A5E9-5F43-82CD-3B9BA6E3131E}" type="datetimeFigureOut">
               <a:rPr lang="en-US" smtClean="0"/>
-              <a:t>1/16/24</a:t>
+              <a:t>1/22/25</a:t>
             </a:fld>
             <a:endParaRPr lang="en-US"/>
           </a:p>
@@ -4206,7 +4316,7 @@
           <a:p>
             <a:fld id="{C21145F5-A5E9-5F43-82CD-3B9BA6E3131E}" type="datetimeFigureOut">
               <a:rPr lang="en-US" smtClean="0"/>
-              <a:t>1/16/24</a:t>
+              <a:t>1/22/25</a:t>
             </a:fld>
             <a:endParaRPr lang="en-US"/>
           </a:p>
@@ -4491,7 +4601,7 @@
           <a:p>
             <a:fld id="{C21145F5-A5E9-5F43-82CD-3B9BA6E3131E}" type="datetimeFigureOut">
               <a:rPr lang="en-US" smtClean="0"/>
-              <a:t>1/16/24</a:t>
+              <a:t>1/22/25</a:t>
             </a:fld>
             <a:endParaRPr lang="en-US"/>
           </a:p>
@@ -4699,7 +4809,7 @@
           <a:p>
             <a:fld id="{C21145F5-A5E9-5F43-82CD-3B9BA6E3131E}" type="datetimeFigureOut">
               <a:rPr lang="en-US" smtClean="0"/>
-              <a:t>1/16/24</a:t>
+              <a:t>1/22/25</a:t>
             </a:fld>
             <a:endParaRPr lang="en-US"/>
           </a:p>
@@ -4907,7 +5017,7 @@
           <a:p>
             <a:fld id="{C21145F5-A5E9-5F43-82CD-3B9BA6E3131E}" type="datetimeFigureOut">
               <a:rPr lang="en-US" smtClean="0"/>
-              <a:t>1/16/24</a:t>
+              <a:t>1/22/25</a:t>
             </a:fld>
             <a:endParaRPr lang="en-US"/>
           </a:p>
@@ -5215,7 +5325,7 @@
           <a:p>
             <a:fld id="{2BB000D9-F882-5444-9F67-E68F2BDFFFE1}" type="datetimeFigureOut">
               <a:rPr lang="en-US" smtClean="0"/>
-              <a:t>1/16/24</a:t>
+              <a:t>1/22/25</a:t>
             </a:fld>
             <a:endParaRPr lang="en-US"/>
           </a:p>
@@ -5482,7 +5592,7 @@
           <a:p>
             <a:fld id="{2BB000D9-F882-5444-9F67-E68F2BDFFFE1}" type="datetimeFigureOut">
               <a:rPr lang="en-US" smtClean="0"/>
-              <a:t>1/16/24</a:t>
+              <a:t>1/22/25</a:t>
             </a:fld>
             <a:endParaRPr lang="en-US"/>
           </a:p>
@@ -5885,7 +5995,7 @@
           <a:p>
             <a:fld id="{2BB000D9-F882-5444-9F67-E68F2BDFFFE1}" type="datetimeFigureOut">
               <a:rPr lang="en-US" smtClean="0"/>
-              <a:t>1/16/24</a:t>
+              <a:t>1/22/25</a:t>
             </a:fld>
             <a:endParaRPr lang="en-US"/>
           </a:p>
@@ -6034,7 +6144,7 @@
           <a:p>
             <a:fld id="{2BB000D9-F882-5444-9F67-E68F2BDFFFE1}" type="datetimeFigureOut">
               <a:rPr lang="en-US" smtClean="0"/>
-              <a:t>1/16/24</a:t>
+              <a:t>1/22/25</a:t>
             </a:fld>
             <a:endParaRPr lang="en-US"/>
           </a:p>
@@ -6153,7 +6263,7 @@
           <a:p>
             <a:fld id="{2BB000D9-F882-5444-9F67-E68F2BDFFFE1}" type="datetimeFigureOut">
               <a:rPr lang="en-US" smtClean="0"/>
-              <a:t>1/16/24</a:t>
+              <a:t>1/22/25</a:t>
             </a:fld>
             <a:endParaRPr lang="en-US"/>
           </a:p>
@@ -6461,7 +6571,7 @@
           <a:p>
             <a:fld id="{2BB000D9-F882-5444-9F67-E68F2BDFFFE1}" type="datetimeFigureOut">
               <a:rPr lang="en-US" smtClean="0"/>
-              <a:t>1/16/24</a:t>
+              <a:t>1/22/25</a:t>
             </a:fld>
             <a:endParaRPr lang="en-US"/>
           </a:p>
@@ -6746,7 +6856,7 @@
           <a:p>
             <a:fld id="{2BB000D9-F882-5444-9F67-E68F2BDFFFE1}" type="datetimeFigureOut">
               <a:rPr lang="en-US" smtClean="0"/>
-              <a:t>1/16/24</a:t>
+              <a:t>1/22/25</a:t>
             </a:fld>
             <a:endParaRPr lang="en-US"/>
           </a:p>
@@ -8980,7 +9090,7 @@
           <p:nvPr>
             <p:extLst>
               <p:ext uri="{D42A27DB-BD31-4B8C-83A1-F6EECF244321}">
-                <p14:modId xmlns:p14="http://schemas.microsoft.com/office/powerpoint/2010/main" val="4007381838"/>
+                <p14:modId xmlns:p14="http://schemas.microsoft.com/office/powerpoint/2010/main" val="1184355237"/>
               </p:ext>
             </p:extLst>
           </p:nvPr>
@@ -9573,7 +9683,7 @@
                         <a:rPr lang="en-GB" sz="1200" b="0" i="0" dirty="0">
                           <a:latin typeface="Helvetica Light" panose="020B0403020202020204" pitchFamily="34" charset="0"/>
                         </a:rPr>
-                        <a:t>Logit </a:t>
+                        <a:t>Logit (log-odds)</a:t>
                       </a:r>
                     </a:p>
                   </a:txBody>
@@ -9788,7 +9898,7 @@
                         <a:rPr lang="en-GB" sz="1200" b="0" i="0" dirty="0">
                           <a:latin typeface="Helvetica Light" panose="020B0403020202020204" pitchFamily="34" charset="0"/>
                         </a:rPr>
-                        <a:t>Logit function on aggregated outcome for successful and failures</a:t>
+                        <a:t>Logit function on aggregated outcome for successful and failures (log-odds)</a:t>
                       </a:r>
                     </a:p>
                   </a:txBody>
@@ -10003,7 +10113,7 @@
                         <a:rPr lang="en-GB" sz="1200" b="0" i="0" dirty="0">
                           <a:latin typeface="Helvetica Light" panose="020B0403020202020204" pitchFamily="34" charset="0"/>
                         </a:rPr>
-                        <a:t>Log or ln</a:t>
+                        <a:t>Log() or ln()</a:t>
                       </a:r>
                     </a:p>
                   </a:txBody>
@@ -10146,36 +10256,6 @@
           </a:p>
         </p:txBody>
       </p:sp>
-      <p:pic>
-        <p:nvPicPr>
-          <p:cNvPr id="7" name="Picture 6">
-            <a:extLst>
-              <a:ext uri="{FF2B5EF4-FFF2-40B4-BE49-F238E27FC236}">
-                <a16:creationId xmlns:a16="http://schemas.microsoft.com/office/drawing/2014/main" id="{76FAD96D-C3B0-6840-83DA-EF333ECAB5F9}"/>
-              </a:ext>
-            </a:extLst>
-          </p:cNvPr>
-          <p:cNvPicPr>
-            <a:picLocks noChangeAspect="1"/>
-          </p:cNvPicPr>
-          <p:nvPr/>
-        </p:nvPicPr>
-        <p:blipFill>
-          <a:blip r:embed="rId5"/>
-          <a:stretch>
-            <a:fillRect/>
-          </a:stretch>
-        </p:blipFill>
-        <p:spPr>
-          <a:xfrm>
-            <a:off x="11090471" y="1170344"/>
-            <a:ext cx="887216" cy="1333249"/>
-          </a:xfrm>
-          <a:prstGeom prst="rect">
-            <a:avLst/>
-          </a:prstGeom>
-        </p:spPr>
-      </p:pic>
       <p:sp>
         <p:nvSpPr>
           <p:cNvPr id="2" name="Slide Number Placeholder 3">
@@ -12025,8 +12105,8 @@
           </p:sp>
         </mc:Fallback>
       </mc:AlternateContent>
-      <mc:AlternateContent xmlns:mc="http://schemas.openxmlformats.org/markup-compatibility/2006" xmlns:a14="http://schemas.microsoft.com/office/drawing/2010/main">
-        <mc:Choice Requires="a14">
+      <mc:AlternateContent xmlns:mc="http://schemas.openxmlformats.org/markup-compatibility/2006">
+        <mc:Choice xmlns:a14="http://schemas.microsoft.com/office/drawing/2010/main" Requires="a14">
           <p:sp>
             <p:nvSpPr>
               <p:cNvPr id="2" name="TextBox 1">
@@ -12064,7 +12144,7 @@
                     <a:latin typeface="Helvetica Neue Light" panose="02000403000000020004" pitchFamily="2" charset="0"/>
                     <a:ea typeface="Helvetica Neue Light" panose="02000403000000020004" pitchFamily="2" charset="0"/>
                   </a:rPr>
-                  <a:t>When estimate our coefficients i.e., </a:t>
+                  <a:t>When we estimate our coefficients i.e., </a:t>
                 </a:r>
                 <a14:m>
                   <m:oMath xmlns:m="http://schemas.openxmlformats.org/officeDocument/2006/math">
@@ -12103,7 +12183,7 @@
                     <a:latin typeface="Helvetica Neue Light" panose="02000403000000020004" pitchFamily="2" charset="0"/>
                     <a:ea typeface="Helvetica Neue Light" panose="02000403000000020004" pitchFamily="2" charset="0"/>
                   </a:rPr>
-                  <a:t>, which shows the linear relationship between the binary or binomial response variable with independent variable </a:t>
+                  <a:t>, it shows the linear relationship between the binary or binomial response variable with independent variable </a:t>
                 </a:r>
                 <a14:m>
                   <m:oMath xmlns:m="http://schemas.openxmlformats.org/officeDocument/2006/math">
@@ -12142,7 +12222,21 @@
                     <a:latin typeface="Helvetica Neue Light" panose="02000403000000020004" pitchFamily="2" charset="0"/>
                     <a:ea typeface="Helvetica Neue Light" panose="02000403000000020004" pitchFamily="2" charset="0"/>
                   </a:rPr>
-                  <a:t> - they are always on the log-odds scale.</a:t>
+                  <a:t> - </a:t>
+                </a:r>
+                <a:r>
+                  <a:rPr lang="en-GB" b="1" u="sng" dirty="0">
+                    <a:latin typeface="Helvetica Neue Light" panose="02000403000000020004" pitchFamily="2" charset="0"/>
+                    <a:ea typeface="Helvetica Neue Light" panose="02000403000000020004" pitchFamily="2" charset="0"/>
+                  </a:rPr>
+                  <a:t>they are always on the log-odds scale</a:t>
+                </a:r>
+                <a:r>
+                  <a:rPr lang="en-GB" dirty="0">
+                    <a:latin typeface="Helvetica Neue Light" panose="02000403000000020004" pitchFamily="2" charset="0"/>
+                    <a:ea typeface="Helvetica Neue Light" panose="02000403000000020004" pitchFamily="2" charset="0"/>
+                  </a:rPr>
+                  <a:t>.</a:t>
                 </a:r>
               </a:p>
               <a:p>
@@ -12204,7 +12298,7 @@
                     <a:latin typeface="Helvetica Neue Light" panose="02000403000000020004" pitchFamily="2" charset="0"/>
                     <a:ea typeface="Helvetica Neue Light" panose="02000403000000020004" pitchFamily="2" charset="0"/>
                   </a:rPr>
-                  <a:t>), to convert in onto the scale of </a:t>
+                  <a:t>), to convert it into a </a:t>
                 </a:r>
                 <a:r>
                   <a:rPr lang="en-GB" b="1" dirty="0">
@@ -12217,7 +12311,7 @@
             </p:txBody>
           </p:sp>
         </mc:Choice>
-        <mc:Fallback xmlns="">
+        <mc:Fallback>
           <p:sp>
             <p:nvSpPr>
               <p:cNvPr id="2" name="TextBox 1">
@@ -12277,7 +12371,7 @@
         <p:spPr>
           <a:xfrm>
             <a:off x="694061" y="5659440"/>
-            <a:ext cx="10179586" cy="646331"/>
+            <a:ext cx="10179586" cy="369332"/>
           </a:xfrm>
           <a:prstGeom prst="rect">
             <a:avLst/>
@@ -12320,7 +12414,7 @@
                 <a:latin typeface="Helvetica Neue Light" panose="02000403000000020004" pitchFamily="2" charset="0"/>
                 <a:ea typeface="Helvetica Neue Light" panose="02000403000000020004" pitchFamily="2" charset="0"/>
               </a:rPr>
-              <a:t>, we want to estimate and interpret from our logistic regression</a:t>
+              <a:t>, we want to report and interpret from our logistic regression</a:t>
             </a:r>
           </a:p>
         </p:txBody>
@@ -12725,7 +12819,7 @@
         </p:nvSpPr>
         <p:spPr>
           <a:xfrm>
-            <a:off x="5392927" y="5309375"/>
+            <a:off x="8954947" y="5155037"/>
             <a:ext cx="2861001" cy="1107996"/>
           </a:xfrm>
           <a:prstGeom prst="rect">
@@ -12749,48 +12843,6 @@
                 <a:ea typeface="Helvetica Neue Thin" panose="020B0403020202020204" pitchFamily="34" charset="0"/>
               </a:rPr>
               <a:t>Notes 1: In the Frequentist approach, we use p-values and 95% CIs to deem whether the odd ratios are statistically significant or not. The Bayesian framework, only 95 credibility intervals are needed for significance.</a:t>
-            </a:r>
-          </a:p>
-        </p:txBody>
-      </p:sp>
-      <p:sp>
-        <p:nvSpPr>
-          <p:cNvPr id="7" name="TextBox 6">
-            <a:extLst>
-              <a:ext uri="{FF2B5EF4-FFF2-40B4-BE49-F238E27FC236}">
-                <a16:creationId xmlns:a16="http://schemas.microsoft.com/office/drawing/2014/main" id="{54A1AF55-FB98-0A40-B1E2-73BC72FC1E0C}"/>
-              </a:ext>
-            </a:extLst>
-          </p:cNvPr>
-          <p:cNvSpPr txBox="1"/>
-          <p:nvPr/>
-        </p:nvSpPr>
-        <p:spPr>
-          <a:xfrm>
-            <a:off x="8394194" y="5309375"/>
-            <a:ext cx="2861001" cy="938719"/>
-          </a:xfrm>
-          <a:prstGeom prst="rect">
-            <a:avLst/>
-          </a:prstGeom>
-          <a:solidFill>
-            <a:schemeClr val="bg2">
-              <a:lumMod val="75000"/>
-            </a:schemeClr>
-          </a:solidFill>
-        </p:spPr>
-        <p:txBody>
-          <a:bodyPr wrap="square" rtlCol="0">
-            <a:spAutoFit/>
-          </a:bodyPr>
-          <a:lstStyle/>
-          <a:p>
-            <a:r>
-              <a:rPr lang="en-GB" sz="1100" dirty="0">
-                <a:latin typeface="Helvetica Neue Thin" panose="020B0403020202020204" pitchFamily="34" charset="0"/>
-                <a:ea typeface="Helvetica Neue Thin" panose="020B0403020202020204" pitchFamily="34" charset="0"/>
-              </a:rPr>
-              <a:t>Notes 2: If you want to do a risk assessment and your study design is a either a cross-sectional or case-control study design with some binary outcome, use a logistic regression model.</a:t>
             </a:r>
           </a:p>
         </p:txBody>
@@ -13422,41 +13474,6 @@
           </a:p>
         </p:txBody>
       </p:sp>
-      <p:sp>
-        <p:nvSpPr>
-          <p:cNvPr id="15" name="Slide Number Placeholder 3">
-            <a:extLst>
-              <a:ext uri="{FF2B5EF4-FFF2-40B4-BE49-F238E27FC236}">
-                <a16:creationId xmlns:a16="http://schemas.microsoft.com/office/drawing/2014/main" id="{F971971C-839B-A945-8833-A8B2181FE762}"/>
-              </a:ext>
-            </a:extLst>
-          </p:cNvPr>
-          <p:cNvSpPr>
-            <a:spLocks noGrp="1"/>
-          </p:cNvSpPr>
-          <p:nvPr>
-            <p:ph type="sldNum" sz="quarter" idx="10"/>
-          </p:nvPr>
-        </p:nvSpPr>
-        <p:spPr>
-          <a:xfrm>
-            <a:off x="11308999" y="6473021"/>
-            <a:ext cx="540000" cy="144000"/>
-          </a:xfrm>
-        </p:spPr>
-        <p:txBody>
-          <a:bodyPr/>
-          <a:lstStyle/>
-          <a:p>
-            <a:fld id="{6C21D7B2-F6DF-4749-BE48-6DFE0A2356E7}" type="slidenum">
-              <a:rPr lang="en-US" altLang="x-none" smtClean="0"/>
-              <a:pPr/>
-              <a:t>15</a:t>
-            </a:fld>
-            <a:endParaRPr lang="en-US" altLang="x-none" dirty="0"/>
-          </a:p>
-        </p:txBody>
-      </p:sp>
       <p:pic>
         <p:nvPicPr>
           <p:cNvPr id="16" name="Picture 15">
@@ -13584,7 +13601,7 @@
                 <a:latin typeface="Helvetica Neue Light" panose="02000403000000020004" pitchFamily="2" charset="0"/>
                 <a:ea typeface="Helvetica Neue Light" panose="02000403000000020004" pitchFamily="2" charset="0"/>
               </a:rPr>
-              <a:t>With particular scenario we are dealing with aggregated units and its either </a:t>
+              <a:t>It is use for dealing with aggregated units the contain information of </a:t>
             </a:r>
             <a:r>
               <a:rPr lang="en-GB" b="1" dirty="0">
@@ -13605,7 +13622,7 @@
                 <a:latin typeface="Helvetica Neue Light" panose="02000403000000020004" pitchFamily="2" charset="0"/>
                 <a:ea typeface="Helvetica Neue Light" panose="02000403000000020004" pitchFamily="2" charset="0"/>
               </a:rPr>
-              <a:t>rates</a:t>
+              <a:t>rates (expressed per capita)</a:t>
             </a:r>
             <a:r>
               <a:rPr lang="en-GB" dirty="0">
@@ -13650,8 +13667,8 @@
           </a:p>
         </p:txBody>
       </p:sp>
-      <mc:AlternateContent xmlns:mc="http://schemas.openxmlformats.org/markup-compatibility/2006">
-        <mc:Choice xmlns:a14="http://schemas.microsoft.com/office/drawing/2010/main" Requires="a14">
+      <mc:AlternateContent xmlns:mc="http://schemas.openxmlformats.org/markup-compatibility/2006" xmlns:a14="http://schemas.microsoft.com/office/drawing/2010/main">
+        <mc:Choice Requires="a14">
           <p:sp>
             <p:nvSpPr>
               <p:cNvPr id="2" name="TextBox 1">
@@ -14320,7 +14337,7 @@
             </p:txBody>
           </p:sp>
         </mc:Choice>
-        <mc:Fallback>
+        <mc:Fallback xmlns="">
           <p:sp>
             <p:nvSpPr>
               <p:cNvPr id="2" name="TextBox 1">
@@ -14384,7 +14401,7 @@
         </p:nvSpPr>
         <p:spPr>
           <a:xfrm>
-            <a:off x="7687457" y="5864529"/>
+            <a:off x="7720508" y="5587530"/>
             <a:ext cx="3858491" cy="923330"/>
           </a:xfrm>
           <a:prstGeom prst="rect">
@@ -14406,6 +14423,190 @@
               </a:rPr>
               <a:t>Often an offset is included to adjust for denominators if the outcome was measured as a rate.</a:t>
             </a:r>
+          </a:p>
+        </p:txBody>
+      </p:sp>
+      <p:sp>
+        <p:nvSpPr>
+          <p:cNvPr id="6" name="Slide Number Placeholder 3">
+            <a:extLst>
+              <a:ext uri="{FF2B5EF4-FFF2-40B4-BE49-F238E27FC236}">
+                <a16:creationId xmlns:a16="http://schemas.microsoft.com/office/drawing/2014/main" id="{7B920AF5-5F60-1E87-5DAF-0205A40DB220}"/>
+              </a:ext>
+            </a:extLst>
+          </p:cNvPr>
+          <p:cNvSpPr txBox="1">
+            <a:spLocks/>
+          </p:cNvSpPr>
+          <p:nvPr/>
+        </p:nvSpPr>
+        <p:spPr>
+          <a:xfrm>
+            <a:off x="11275948" y="6373870"/>
+            <a:ext cx="540000" cy="144000"/>
+          </a:xfrm>
+          <a:prstGeom prst="rect">
+            <a:avLst/>
+          </a:prstGeom>
+          <a:extLst>
+            <a:ext uri="{909E8E84-426E-40dd-AFC4-6F175D3DCCD1}">
+              <a14:hiddenFill xmlns="" xmlns:a14="http://schemas.microsoft.com/office/drawing/2010/main">
+                <a:solidFill>
+                  <a:srgbClr val="FFFFFF"/>
+                </a:solidFill>
+              </a14:hiddenFill>
+            </a:ext>
+            <a:ext uri="{91240B29-F687-4f45-9708-019B960494DF}">
+              <a14:hiddenLine xmlns="" xmlns:a14="http://schemas.microsoft.com/office/drawing/2010/main" w="9525">
+                <a:solidFill>
+                  <a:srgbClr val="000000"/>
+                </a:solidFill>
+                <a:miter lim="800000"/>
+                <a:headEnd/>
+                <a:tailEnd/>
+              </a14:hiddenLine>
+            </a:ext>
+          </a:extLst>
+        </p:spPr>
+        <p:txBody>
+          <a:bodyPr/>
+          <a:lstStyle>
+            <a:defPPr>
+              <a:defRPr lang="en-US"/>
+            </a:defPPr>
+            <a:lvl1pPr marL="0" algn="l" defTabSz="914400" rtl="0" eaLnBrk="0" latinLnBrk="0" hangingPunct="0">
+              <a:defRPr sz="1800" kern="1200">
+                <a:solidFill>
+                  <a:schemeClr val="tx1"/>
+                </a:solidFill>
+                <a:latin typeface="Arial" charset="0"/>
+                <a:ea typeface="ＭＳ Ｐゴシック" charset="0"/>
+                <a:cs typeface="Arial" charset="0"/>
+              </a:defRPr>
+            </a:lvl1pPr>
+            <a:lvl2pPr marL="778225" indent="-299317" algn="l" defTabSz="914400" rtl="0" eaLnBrk="0" latinLnBrk="0" hangingPunct="0">
+              <a:defRPr sz="1800" kern="1200">
+                <a:solidFill>
+                  <a:schemeClr val="tx1"/>
+                </a:solidFill>
+                <a:latin typeface="Arial" charset="0"/>
+                <a:ea typeface="Arial" charset="0"/>
+                <a:cs typeface="Arial" charset="0"/>
+              </a:defRPr>
+            </a:lvl2pPr>
+            <a:lvl3pPr marL="1197270" indent="-239454" algn="l" defTabSz="914400" rtl="0" eaLnBrk="0" latinLnBrk="0" hangingPunct="0">
+              <a:defRPr sz="1800" kern="1200">
+                <a:solidFill>
+                  <a:schemeClr val="tx1"/>
+                </a:solidFill>
+                <a:latin typeface="Arial" charset="0"/>
+                <a:ea typeface="Arial" charset="0"/>
+                <a:cs typeface="Arial" charset="0"/>
+              </a:defRPr>
+            </a:lvl3pPr>
+            <a:lvl4pPr marL="1676177" indent="-239454" algn="l" defTabSz="914400" rtl="0" eaLnBrk="0" latinLnBrk="0" hangingPunct="0">
+              <a:defRPr sz="1800" kern="1200">
+                <a:solidFill>
+                  <a:schemeClr val="tx1"/>
+                </a:solidFill>
+                <a:latin typeface="Arial" charset="0"/>
+                <a:ea typeface="Arial" charset="0"/>
+                <a:cs typeface="Arial" charset="0"/>
+              </a:defRPr>
+            </a:lvl4pPr>
+            <a:lvl5pPr marL="2155085" indent="-239454" algn="l" defTabSz="914400" rtl="0" eaLnBrk="0" latinLnBrk="0" hangingPunct="0">
+              <a:defRPr sz="1800" kern="1200">
+                <a:solidFill>
+                  <a:schemeClr val="tx1"/>
+                </a:solidFill>
+                <a:latin typeface="Arial" charset="0"/>
+                <a:ea typeface="Arial" charset="0"/>
+                <a:cs typeface="Arial" charset="0"/>
+              </a:defRPr>
+            </a:lvl5pPr>
+            <a:lvl6pPr marL="2633993" indent="-239454" algn="l" defTabSz="914400" rtl="0" eaLnBrk="0" fontAlgn="base" latinLnBrk="0" hangingPunct="0">
+              <a:spcBef>
+                <a:spcPct val="0"/>
+              </a:spcBef>
+              <a:spcAft>
+                <a:spcPct val="0"/>
+              </a:spcAft>
+              <a:defRPr sz="1800" kern="1200">
+                <a:solidFill>
+                  <a:schemeClr val="tx1"/>
+                </a:solidFill>
+                <a:latin typeface="Arial" charset="0"/>
+                <a:ea typeface="Arial" charset="0"/>
+                <a:cs typeface="Arial" charset="0"/>
+              </a:defRPr>
+            </a:lvl6pPr>
+            <a:lvl7pPr marL="3112901" indent="-239454" algn="l" defTabSz="914400" rtl="0" eaLnBrk="0" fontAlgn="base" latinLnBrk="0" hangingPunct="0">
+              <a:spcBef>
+                <a:spcPct val="0"/>
+              </a:spcBef>
+              <a:spcAft>
+                <a:spcPct val="0"/>
+              </a:spcAft>
+              <a:defRPr sz="1800" kern="1200">
+                <a:solidFill>
+                  <a:schemeClr val="tx1"/>
+                </a:solidFill>
+                <a:latin typeface="Arial" charset="0"/>
+                <a:ea typeface="Arial" charset="0"/>
+                <a:cs typeface="Arial" charset="0"/>
+              </a:defRPr>
+            </a:lvl7pPr>
+            <a:lvl8pPr marL="3591809" indent="-239454" algn="l" defTabSz="914400" rtl="0" eaLnBrk="0" fontAlgn="base" latinLnBrk="0" hangingPunct="0">
+              <a:spcBef>
+                <a:spcPct val="0"/>
+              </a:spcBef>
+              <a:spcAft>
+                <a:spcPct val="0"/>
+              </a:spcAft>
+              <a:defRPr sz="1800" kern="1200">
+                <a:solidFill>
+                  <a:schemeClr val="tx1"/>
+                </a:solidFill>
+                <a:latin typeface="Arial" charset="0"/>
+                <a:ea typeface="Arial" charset="0"/>
+                <a:cs typeface="Arial" charset="0"/>
+              </a:defRPr>
+            </a:lvl8pPr>
+            <a:lvl9pPr marL="4070717" indent="-239454" algn="l" defTabSz="914400" rtl="0" eaLnBrk="0" fontAlgn="base" latinLnBrk="0" hangingPunct="0">
+              <a:spcBef>
+                <a:spcPct val="0"/>
+              </a:spcBef>
+              <a:spcAft>
+                <a:spcPct val="0"/>
+              </a:spcAft>
+              <a:defRPr sz="1800" kern="1200">
+                <a:solidFill>
+                  <a:schemeClr val="tx1"/>
+                </a:solidFill>
+                <a:latin typeface="Arial" charset="0"/>
+                <a:ea typeface="Arial" charset="0"/>
+                <a:cs typeface="Arial" charset="0"/>
+              </a:defRPr>
+            </a:lvl9pPr>
+          </a:lstStyle>
+          <a:p>
+            <a:pPr eaLnBrk="1" hangingPunct="1"/>
+            <a:fld id="{0447D3D2-708A-E34B-88EA-90194C1A2EE9}" type="slidenum">
+              <a:rPr lang="en-US" smtClean="0">
+                <a:solidFill>
+                  <a:srgbClr val="000000"/>
+                </a:solidFill>
+                <a:cs typeface="ＭＳ Ｐゴシック" charset="0"/>
+              </a:rPr>
+              <a:pPr eaLnBrk="1" hangingPunct="1"/>
+              <a:t>15</a:t>
+            </a:fld>
+            <a:endParaRPr lang="en-US" dirty="0">
+              <a:solidFill>
+                <a:srgbClr val="000000"/>
+              </a:solidFill>
+              <a:cs typeface="ＭＳ Ｐゴシック" charset="0"/>
+            </a:endParaRPr>
           </a:p>
         </p:txBody>
       </p:sp>
@@ -14525,8 +14726,8 @@
           </a:prstGeom>
         </p:spPr>
       </p:pic>
-      <mc:AlternateContent xmlns:mc="http://schemas.openxmlformats.org/markup-compatibility/2006" xmlns:a14="http://schemas.microsoft.com/office/drawing/2010/main">
-        <mc:Choice Requires="a14">
+      <mc:AlternateContent xmlns:mc="http://schemas.openxmlformats.org/markup-compatibility/2006">
+        <mc:Choice xmlns:a14="http://schemas.microsoft.com/office/drawing/2010/main" Requires="a14">
           <p:sp>
             <p:nvSpPr>
               <p:cNvPr id="2" name="TextBox 1">
@@ -14704,7 +14905,7 @@
                     <a:latin typeface="Helvetica Neue Light" panose="02000403000000020004" pitchFamily="2" charset="0"/>
                     <a:ea typeface="Helvetica Neue Light" panose="02000403000000020004" pitchFamily="2" charset="0"/>
                   </a:rPr>
-                  <a:t>), to convert it onto the scale of </a:t>
+                  <a:t>), to convert it into a </a:t>
                 </a:r>
                 <a:r>
                   <a:rPr lang="en-GB" b="1" dirty="0">
@@ -14717,7 +14918,7 @@
             </p:txBody>
           </p:sp>
         </mc:Choice>
-        <mc:Fallback xmlns="">
+        <mc:Fallback>
           <p:sp>
             <p:nvSpPr>
               <p:cNvPr id="2" name="TextBox 1">
@@ -14806,21 +15007,21 @@
                 <a:latin typeface="Helvetica Neue Light" panose="02000403000000020004" pitchFamily="2" charset="0"/>
                 <a:ea typeface="Helvetica Neue Light" panose="02000403000000020004" pitchFamily="2" charset="0"/>
               </a:rPr>
-              <a:t>This is the quantity i.e., </a:t>
+              <a:t>This quantity i.e., </a:t>
             </a:r>
             <a:r>
               <a:rPr lang="en-GB" b="1" dirty="0">
                 <a:latin typeface="Helvetica Neue Light" panose="02000403000000020004" pitchFamily="2" charset="0"/>
                 <a:ea typeface="Helvetica Neue Light" panose="02000403000000020004" pitchFamily="2" charset="0"/>
               </a:rPr>
-              <a:t>Risk Ratios (RR) (interchangeable with Relative Risk)</a:t>
+              <a:t>Risk Ratios (RR) (interchangeable with the term Relative Risk Ratios)</a:t>
             </a:r>
             <a:r>
               <a:rPr lang="en-GB" dirty="0">
                 <a:latin typeface="Helvetica Neue Light" panose="02000403000000020004" pitchFamily="2" charset="0"/>
                 <a:ea typeface="Helvetica Neue Light" panose="02000403000000020004" pitchFamily="2" charset="0"/>
               </a:rPr>
-              <a:t>, we want to estimate and interpret from our Poisson regression</a:t>
+              <a:t>, is the thing we want to report and interpret from our Poisson regression</a:t>
             </a:r>
           </a:p>
         </p:txBody>
@@ -15572,7 +15773,7 @@
                 <a:latin typeface="Helvetica Neue Thin" panose="020B0403020202020204" pitchFamily="34" charset="0"/>
                 <a:ea typeface="Helvetica Neue Thin" panose="020B0403020202020204" pitchFamily="34" charset="0"/>
               </a:rPr>
-              <a:t>RR &lt; 1,  the independent variable has an impact on the outcome – in this case, its reduced effect, or reduced risk on the outcome</a:t>
+              <a:t>RR &lt; 1,  the independent variable has an impact on the outcome – in this case, it’s a reduced effect, or reduced risk of the outcome</a:t>
             </a:r>
           </a:p>
           <a:p>
@@ -15594,7 +15795,7 @@
                 <a:latin typeface="HELVETICA NEUE THIN" panose="020B0403020202020204" pitchFamily="34" charset="0"/>
                 <a:ea typeface="HELVETICA NEUE THIN" panose="020B0403020202020204" pitchFamily="34" charset="0"/>
               </a:rPr>
-              <a:t>&gt; 1, the independent variable has an impact on the outcome – and so, in this case, its increased effect, or increased risk on the outcome</a:t>
+              <a:t>&gt; 1, the independent variable has an impact on the outcome – and so, in this case, it has an increased effect, or increased risk on the outcome</a:t>
             </a:r>
           </a:p>
           <a:p>
@@ -15686,7 +15887,7 @@
         </p:nvSpPr>
         <p:spPr>
           <a:xfrm>
-            <a:off x="4848968" y="4994631"/>
+            <a:off x="8936227" y="5086350"/>
             <a:ext cx="2861001" cy="1107996"/>
           </a:xfrm>
           <a:prstGeom prst="rect">
@@ -15710,48 +15911,6 @@
                 <a:ea typeface="Helvetica Neue Thin" panose="020B0403020202020204" pitchFamily="34" charset="0"/>
               </a:rPr>
               <a:t>Notes 1: From the Frequentist approach, We use p-values and 95% CIs to deem whether the risk ratios are statistically significant or not. In the Bayesian, we don’t deal with p-values, only 95% credibility intervals</a:t>
-            </a:r>
-          </a:p>
-        </p:txBody>
-      </p:sp>
-      <p:sp>
-        <p:nvSpPr>
-          <p:cNvPr id="7" name="TextBox 6">
-            <a:extLst>
-              <a:ext uri="{FF2B5EF4-FFF2-40B4-BE49-F238E27FC236}">
-                <a16:creationId xmlns:a16="http://schemas.microsoft.com/office/drawing/2014/main" id="{54A1AF55-FB98-0A40-B1E2-73BC72FC1E0C}"/>
-              </a:ext>
-            </a:extLst>
-          </p:cNvPr>
-          <p:cNvSpPr txBox="1"/>
-          <p:nvPr/>
-        </p:nvSpPr>
-        <p:spPr>
-          <a:xfrm>
-            <a:off x="7845556" y="4994631"/>
-            <a:ext cx="2861001" cy="1107996"/>
-          </a:xfrm>
-          <a:prstGeom prst="rect">
-            <a:avLst/>
-          </a:prstGeom>
-          <a:solidFill>
-            <a:schemeClr val="bg2">
-              <a:lumMod val="75000"/>
-            </a:schemeClr>
-          </a:solidFill>
-        </p:spPr>
-        <p:txBody>
-          <a:bodyPr wrap="square" rtlCol="0">
-            <a:spAutoFit/>
-          </a:bodyPr>
-          <a:lstStyle/>
-          <a:p>
-            <a:r>
-              <a:rPr lang="en-GB" sz="1100" dirty="0">
-                <a:latin typeface="Helvetica Neue Thin" panose="020B0403020202020204" pitchFamily="34" charset="0"/>
-                <a:ea typeface="Helvetica Neue Thin" panose="020B0403020202020204" pitchFamily="34" charset="0"/>
-              </a:rPr>
-              <a:t>Notes 2: If you want to do a risk assessment and you study design is an either an ecological study design where you have counts and denominators for rates, and also for cohort study when following groups of participants prospectively</a:t>
             </a:r>
           </a:p>
         </p:txBody>
@@ -16670,7 +16829,7 @@
                 <a:latin typeface="HELVETICA NEUE LIGHT" panose="02000403000000020004" pitchFamily="2" charset="0"/>
                 <a:ea typeface="HELVETICA NEUE LIGHT" panose="02000403000000020004" pitchFamily="2" charset="0"/>
               </a:rPr>
-              <a:t>Use: regression Poisson model</a:t>
+              <a:t>Use: Standard Poisson model</a:t>
             </a:r>
           </a:p>
         </p:txBody>
@@ -16821,8 +16980,8 @@
         </p:nvSpPr>
         <p:spPr>
           <a:xfrm>
-            <a:off x="3257779" y="1364617"/>
-            <a:ext cx="5676442" cy="369332"/>
+            <a:off x="2773037" y="1353601"/>
+            <a:ext cx="6404014" cy="369332"/>
           </a:xfrm>
           <a:prstGeom prst="rect">
             <a:avLst/>
@@ -16841,44 +17000,6 @@
                 <a:ea typeface="HELVETICA NEUE THIN" panose="020B0403020202020204" pitchFamily="34" charset="0"/>
               </a:rPr>
               <a:t>Examine the frequency distribution of the count response </a:t>
-            </a:r>
-          </a:p>
-        </p:txBody>
-      </p:sp>
-      <p:sp>
-        <p:nvSpPr>
-          <p:cNvPr id="12" name="TextBox 11">
-            <a:extLst>
-              <a:ext uri="{FF2B5EF4-FFF2-40B4-BE49-F238E27FC236}">
-                <a16:creationId xmlns:a16="http://schemas.microsoft.com/office/drawing/2014/main" id="{3EA9C24E-B386-4D4A-BEF8-065E01B632CD}"/>
-              </a:ext>
-            </a:extLst>
-          </p:cNvPr>
-          <p:cNvSpPr txBox="1"/>
-          <p:nvPr/>
-        </p:nvSpPr>
-        <p:spPr>
-          <a:xfrm>
-            <a:off x="7976212" y="5761822"/>
-            <a:ext cx="3358308" cy="523220"/>
-          </a:xfrm>
-          <a:prstGeom prst="rect">
-            <a:avLst/>
-          </a:prstGeom>
-          <a:noFill/>
-        </p:spPr>
-        <p:txBody>
-          <a:bodyPr wrap="square" rtlCol="0">
-            <a:spAutoFit/>
-          </a:bodyPr>
-          <a:lstStyle/>
-          <a:p>
-            <a:r>
-              <a:rPr lang="en-GB" sz="1400" dirty="0">
-                <a:latin typeface="Helvetica Neue Light" panose="02000403000000020004" pitchFamily="2" charset="0"/>
-                <a:ea typeface="Helvetica Neue Light" panose="02000403000000020004" pitchFamily="2" charset="0"/>
-              </a:rPr>
-              <a:t>Use as last restore if scenario is gives you unstable results.</a:t>
             </a:r>
           </a:p>
         </p:txBody>
@@ -17309,7 +17430,29 @@
                 <a:ea typeface="Helvetica Neue Light" panose="02000403000000020004" pitchFamily="2" charset="0"/>
                 <a:cs typeface="Helvetica Neue" panose="02000503000000020004" pitchFamily="2" charset="0"/>
               </a:rPr>
-              <a:t>What are Generalized Linear Models (GLMs)?</a:t>
+              <a:t>What are </a:t>
+            </a:r>
+            <a:r>
+              <a:rPr lang="en-US" sz="2000" kern="0" dirty="0" err="1">
+                <a:solidFill>
+                  <a:srgbClr val="000000"/>
+                </a:solidFill>
+                <a:latin typeface="Helvetica Neue Light" panose="02000403000000020004" pitchFamily="2" charset="0"/>
+                <a:ea typeface="Helvetica Neue Light" panose="02000403000000020004" pitchFamily="2" charset="0"/>
+                <a:cs typeface="Helvetica Neue" panose="02000503000000020004" pitchFamily="2" charset="0"/>
+              </a:rPr>
+              <a:t>Generalised</a:t>
+            </a:r>
+            <a:r>
+              <a:rPr lang="en-US" sz="2000" kern="0" dirty="0">
+                <a:solidFill>
+                  <a:srgbClr val="000000"/>
+                </a:solidFill>
+                <a:latin typeface="Helvetica Neue Light" panose="02000403000000020004" pitchFamily="2" charset="0"/>
+                <a:ea typeface="Helvetica Neue Light" panose="02000403000000020004" pitchFamily="2" charset="0"/>
+                <a:cs typeface="Helvetica Neue" panose="02000503000000020004" pitchFamily="2" charset="0"/>
+              </a:rPr>
+              <a:t> Linear Models (GLMs)?</a:t>
             </a:r>
           </a:p>
           <a:p>
@@ -19489,6 +19632,322 @@
   <p:cSld>
     <p:spTree>
       <p:nvGrpSpPr>
+        <p:cNvPr id="1" name="">
+          <a:extLst>
+            <a:ext uri="{FF2B5EF4-FFF2-40B4-BE49-F238E27FC236}">
+              <a16:creationId xmlns:a16="http://schemas.microsoft.com/office/drawing/2014/main" id="{F5F0C68A-31EF-1A65-3A4C-30FD032CD070}"/>
+            </a:ext>
+          </a:extLst>
+        </p:cNvPr>
+        <p:cNvGrpSpPr/>
+        <p:nvPr/>
+      </p:nvGrpSpPr>
+      <p:grpSpPr>
+        <a:xfrm>
+          <a:off x="0" y="0"/>
+          <a:ext cx="0" cy="0"/>
+          <a:chOff x="0" y="0"/>
+          <a:chExt cx="0" cy="0"/>
+        </a:xfrm>
+      </p:grpSpPr>
+      <p:sp>
+        <p:nvSpPr>
+          <p:cNvPr id="2" name="Rectangle 1">
+            <a:extLst>
+              <a:ext uri="{FF2B5EF4-FFF2-40B4-BE49-F238E27FC236}">
+                <a16:creationId xmlns:a16="http://schemas.microsoft.com/office/drawing/2014/main" id="{6C4AC332-2800-D3EE-2E54-C7B6C3FCCC42}"/>
+              </a:ext>
+            </a:extLst>
+          </p:cNvPr>
+          <p:cNvSpPr/>
+          <p:nvPr/>
+        </p:nvSpPr>
+        <p:spPr>
+          <a:xfrm>
+            <a:off x="0" y="0"/>
+            <a:ext cx="12192000" cy="6858000"/>
+          </a:xfrm>
+          <a:prstGeom prst="rect">
+            <a:avLst/>
+          </a:prstGeom>
+          <a:solidFill>
+            <a:srgbClr val="008CE6"/>
+          </a:solidFill>
+          <a:ln>
+            <a:solidFill>
+              <a:srgbClr val="009193"/>
+            </a:solidFill>
+          </a:ln>
+        </p:spPr>
+        <p:style>
+          <a:lnRef idx="2">
+            <a:schemeClr val="accent1">
+              <a:shade val="50000"/>
+            </a:schemeClr>
+          </a:lnRef>
+          <a:fillRef idx="1">
+            <a:schemeClr val="accent1"/>
+          </a:fillRef>
+          <a:effectRef idx="0">
+            <a:schemeClr val="accent1"/>
+          </a:effectRef>
+          <a:fontRef idx="minor">
+            <a:schemeClr val="lt1"/>
+          </a:fontRef>
+        </p:style>
+        <p:txBody>
+          <a:bodyPr rtlCol="0" anchor="ctr"/>
+          <a:lstStyle/>
+          <a:p>
+            <a:pPr algn="ctr"/>
+            <a:endParaRPr lang="en-US"/>
+          </a:p>
+        </p:txBody>
+      </p:sp>
+      <p:sp>
+        <p:nvSpPr>
+          <p:cNvPr id="5" name="Title 1">
+            <a:extLst>
+              <a:ext uri="{FF2B5EF4-FFF2-40B4-BE49-F238E27FC236}">
+                <a16:creationId xmlns:a16="http://schemas.microsoft.com/office/drawing/2014/main" id="{F614982B-2E7C-2C71-49D8-FFD3E41596D5}"/>
+              </a:ext>
+            </a:extLst>
+          </p:cNvPr>
+          <p:cNvSpPr>
+            <a:spLocks noGrp="1"/>
+          </p:cNvSpPr>
+          <p:nvPr>
+            <p:ph type="title"/>
+          </p:nvPr>
+        </p:nvSpPr>
+        <p:spPr>
+          <a:xfrm>
+            <a:off x="587375" y="3233296"/>
+            <a:ext cx="11233150" cy="1296988"/>
+          </a:xfrm>
+        </p:spPr>
+        <p:txBody>
+          <a:bodyPr/>
+          <a:lstStyle/>
+          <a:p>
+            <a:pPr>
+              <a:defRPr/>
+            </a:pPr>
+            <a:r>
+              <a:rPr lang="en-US" sz="3600" b="1" dirty="0">
+                <a:solidFill>
+                  <a:schemeClr val="bg1"/>
+                </a:solidFill>
+                <a:latin typeface="Helvetica Neue Light" panose="02000403000000020004" pitchFamily="2" charset="0"/>
+                <a:ea typeface="Helvetica Neue Light" panose="02000403000000020004" pitchFamily="2" charset="0"/>
+              </a:rPr>
+              <a:t>GLMs in a Bayesian Framework</a:t>
+            </a:r>
+          </a:p>
+        </p:txBody>
+      </p:sp>
+      <p:sp>
+        <p:nvSpPr>
+          <p:cNvPr id="3" name="Slide Number Placeholder 3">
+            <a:extLst>
+              <a:ext uri="{FF2B5EF4-FFF2-40B4-BE49-F238E27FC236}">
+                <a16:creationId xmlns:a16="http://schemas.microsoft.com/office/drawing/2014/main" id="{F831C2A3-2063-B094-E7AB-DC546AE5ABB9}"/>
+              </a:ext>
+            </a:extLst>
+          </p:cNvPr>
+          <p:cNvSpPr txBox="1">
+            <a:spLocks/>
+          </p:cNvSpPr>
+          <p:nvPr/>
+        </p:nvSpPr>
+        <p:spPr>
+          <a:xfrm>
+            <a:off x="11275948" y="6373870"/>
+            <a:ext cx="540000" cy="144000"/>
+          </a:xfrm>
+          <a:prstGeom prst="rect">
+            <a:avLst/>
+          </a:prstGeom>
+          <a:extLst>
+            <a:ext uri="{909E8E84-426E-40dd-AFC4-6F175D3DCCD1}">
+              <a14:hiddenFill xmlns="" xmlns:a14="http://schemas.microsoft.com/office/drawing/2010/main">
+                <a:solidFill>
+                  <a:srgbClr val="FFFFFF"/>
+                </a:solidFill>
+              </a14:hiddenFill>
+            </a:ext>
+            <a:ext uri="{91240B29-F687-4f45-9708-019B960494DF}">
+              <a14:hiddenLine xmlns="" xmlns:a14="http://schemas.microsoft.com/office/drawing/2010/main" w="9525">
+                <a:solidFill>
+                  <a:srgbClr val="000000"/>
+                </a:solidFill>
+                <a:miter lim="800000"/>
+                <a:headEnd/>
+                <a:tailEnd/>
+              </a14:hiddenLine>
+            </a:ext>
+          </a:extLst>
+        </p:spPr>
+        <p:txBody>
+          <a:bodyPr/>
+          <a:lstStyle>
+            <a:defPPr>
+              <a:defRPr lang="en-US"/>
+            </a:defPPr>
+            <a:lvl1pPr marL="0" algn="l" defTabSz="914400" rtl="0" eaLnBrk="0" latinLnBrk="0" hangingPunct="0">
+              <a:defRPr sz="1800" kern="1200">
+                <a:solidFill>
+                  <a:schemeClr val="tx1"/>
+                </a:solidFill>
+                <a:latin typeface="Arial" charset="0"/>
+                <a:ea typeface="ＭＳ Ｐゴシック" charset="0"/>
+                <a:cs typeface="Arial" charset="0"/>
+              </a:defRPr>
+            </a:lvl1pPr>
+            <a:lvl2pPr marL="778225" indent="-299317" algn="l" defTabSz="914400" rtl="0" eaLnBrk="0" latinLnBrk="0" hangingPunct="0">
+              <a:defRPr sz="1800" kern="1200">
+                <a:solidFill>
+                  <a:schemeClr val="tx1"/>
+                </a:solidFill>
+                <a:latin typeface="Arial" charset="0"/>
+                <a:ea typeface="Arial" charset="0"/>
+                <a:cs typeface="Arial" charset="0"/>
+              </a:defRPr>
+            </a:lvl2pPr>
+            <a:lvl3pPr marL="1197270" indent="-239454" algn="l" defTabSz="914400" rtl="0" eaLnBrk="0" latinLnBrk="0" hangingPunct="0">
+              <a:defRPr sz="1800" kern="1200">
+                <a:solidFill>
+                  <a:schemeClr val="tx1"/>
+                </a:solidFill>
+                <a:latin typeface="Arial" charset="0"/>
+                <a:ea typeface="Arial" charset="0"/>
+                <a:cs typeface="Arial" charset="0"/>
+              </a:defRPr>
+            </a:lvl3pPr>
+            <a:lvl4pPr marL="1676177" indent="-239454" algn="l" defTabSz="914400" rtl="0" eaLnBrk="0" latinLnBrk="0" hangingPunct="0">
+              <a:defRPr sz="1800" kern="1200">
+                <a:solidFill>
+                  <a:schemeClr val="tx1"/>
+                </a:solidFill>
+                <a:latin typeface="Arial" charset="0"/>
+                <a:ea typeface="Arial" charset="0"/>
+                <a:cs typeface="Arial" charset="0"/>
+              </a:defRPr>
+            </a:lvl4pPr>
+            <a:lvl5pPr marL="2155085" indent="-239454" algn="l" defTabSz="914400" rtl="0" eaLnBrk="0" latinLnBrk="0" hangingPunct="0">
+              <a:defRPr sz="1800" kern="1200">
+                <a:solidFill>
+                  <a:schemeClr val="tx1"/>
+                </a:solidFill>
+                <a:latin typeface="Arial" charset="0"/>
+                <a:ea typeface="Arial" charset="0"/>
+                <a:cs typeface="Arial" charset="0"/>
+              </a:defRPr>
+            </a:lvl5pPr>
+            <a:lvl6pPr marL="2633993" indent="-239454" algn="l" defTabSz="914400" rtl="0" eaLnBrk="0" fontAlgn="base" latinLnBrk="0" hangingPunct="0">
+              <a:spcBef>
+                <a:spcPct val="0"/>
+              </a:spcBef>
+              <a:spcAft>
+                <a:spcPct val="0"/>
+              </a:spcAft>
+              <a:defRPr sz="1800" kern="1200">
+                <a:solidFill>
+                  <a:schemeClr val="tx1"/>
+                </a:solidFill>
+                <a:latin typeface="Arial" charset="0"/>
+                <a:ea typeface="Arial" charset="0"/>
+                <a:cs typeface="Arial" charset="0"/>
+              </a:defRPr>
+            </a:lvl6pPr>
+            <a:lvl7pPr marL="3112901" indent="-239454" algn="l" defTabSz="914400" rtl="0" eaLnBrk="0" fontAlgn="base" latinLnBrk="0" hangingPunct="0">
+              <a:spcBef>
+                <a:spcPct val="0"/>
+              </a:spcBef>
+              <a:spcAft>
+                <a:spcPct val="0"/>
+              </a:spcAft>
+              <a:defRPr sz="1800" kern="1200">
+                <a:solidFill>
+                  <a:schemeClr val="tx1"/>
+                </a:solidFill>
+                <a:latin typeface="Arial" charset="0"/>
+                <a:ea typeface="Arial" charset="0"/>
+                <a:cs typeface="Arial" charset="0"/>
+              </a:defRPr>
+            </a:lvl7pPr>
+            <a:lvl8pPr marL="3591809" indent="-239454" algn="l" defTabSz="914400" rtl="0" eaLnBrk="0" fontAlgn="base" latinLnBrk="0" hangingPunct="0">
+              <a:spcBef>
+                <a:spcPct val="0"/>
+              </a:spcBef>
+              <a:spcAft>
+                <a:spcPct val="0"/>
+              </a:spcAft>
+              <a:defRPr sz="1800" kern="1200">
+                <a:solidFill>
+                  <a:schemeClr val="tx1"/>
+                </a:solidFill>
+                <a:latin typeface="Arial" charset="0"/>
+                <a:ea typeface="Arial" charset="0"/>
+                <a:cs typeface="Arial" charset="0"/>
+              </a:defRPr>
+            </a:lvl8pPr>
+            <a:lvl9pPr marL="4070717" indent="-239454" algn="l" defTabSz="914400" rtl="0" eaLnBrk="0" fontAlgn="base" latinLnBrk="0" hangingPunct="0">
+              <a:spcBef>
+                <a:spcPct val="0"/>
+              </a:spcBef>
+              <a:spcAft>
+                <a:spcPct val="0"/>
+              </a:spcAft>
+              <a:defRPr sz="1800" kern="1200">
+                <a:solidFill>
+                  <a:schemeClr val="tx1"/>
+                </a:solidFill>
+                <a:latin typeface="Arial" charset="0"/>
+                <a:ea typeface="Arial" charset="0"/>
+                <a:cs typeface="Arial" charset="0"/>
+              </a:defRPr>
+            </a:lvl9pPr>
+          </a:lstStyle>
+          <a:p>
+            <a:pPr eaLnBrk="1" hangingPunct="1"/>
+            <a:fld id="{0447D3D2-708A-E34B-88EA-90194C1A2EE9}" type="slidenum">
+              <a:rPr lang="en-US" smtClean="0">
+                <a:solidFill>
+                  <a:srgbClr val="000000"/>
+                </a:solidFill>
+                <a:cs typeface="ＭＳ Ｐゴシック" charset="0"/>
+              </a:rPr>
+              <a:pPr eaLnBrk="1" hangingPunct="1"/>
+              <a:t>20</a:t>
+            </a:fld>
+            <a:endParaRPr lang="en-US" dirty="0">
+              <a:solidFill>
+                <a:srgbClr val="000000"/>
+              </a:solidFill>
+              <a:cs typeface="ＭＳ Ｐゴシック" charset="0"/>
+            </a:endParaRPr>
+          </a:p>
+        </p:txBody>
+      </p:sp>
+    </p:spTree>
+    <p:extLst>
+      <p:ext uri="{BB962C8B-B14F-4D97-AF65-F5344CB8AC3E}">
+        <p14:creationId xmlns:p14="http://schemas.microsoft.com/office/powerpoint/2010/main" val="2376754002"/>
+      </p:ext>
+    </p:extLst>
+  </p:cSld>
+  <p:clrMapOvr>
+    <a:masterClrMapping/>
+  </p:clrMapOvr>
+</p:sld>
+</file>
+
+<file path=ppt/slides/slide21.xml><?xml version="1.0" encoding="utf-8"?>
+<p:sld xmlns:a="http://schemas.openxmlformats.org/drawingml/2006/main" xmlns:r="http://schemas.openxmlformats.org/officeDocument/2006/relationships" xmlns:p="http://schemas.openxmlformats.org/presentationml/2006/main">
+  <p:cSld>
+    <p:spTree>
+      <p:nvGrpSpPr>
         <p:cNvPr id="1" name=""/>
         <p:cNvGrpSpPr/>
         <p:nvPr/>
@@ -19731,7 +20190,7 @@
         </p:nvSpPr>
         <p:spPr>
           <a:xfrm>
-            <a:off x="1958706" y="4980067"/>
+            <a:off x="549006" y="4418207"/>
             <a:ext cx="8226694" cy="461665"/>
           </a:xfrm>
           <a:prstGeom prst="rect">
@@ -19929,7 +20388,7 @@
                 <a:cs typeface="ＭＳ Ｐゴシック" charset="0"/>
               </a:rPr>
               <a:pPr eaLnBrk="1" hangingPunct="1"/>
-              <a:t>20</a:t>
+              <a:t>21</a:t>
             </a:fld>
             <a:endParaRPr lang="en-US" dirty="0">
               <a:solidFill>
@@ -19937,6 +20396,59 @@
               </a:solidFill>
               <a:cs typeface="ＭＳ Ｐゴシック" charset="0"/>
             </a:endParaRPr>
+          </a:p>
+        </p:txBody>
+      </p:sp>
+      <p:sp>
+        <p:nvSpPr>
+          <p:cNvPr id="3" name="TextBox 2">
+            <a:extLst>
+              <a:ext uri="{FF2B5EF4-FFF2-40B4-BE49-F238E27FC236}">
+                <a16:creationId xmlns:a16="http://schemas.microsoft.com/office/drawing/2014/main" id="{06BF5B19-89F9-F79B-C8EF-6EB16AB40AB3}"/>
+              </a:ext>
+            </a:extLst>
+          </p:cNvPr>
+          <p:cNvSpPr txBox="1"/>
+          <p:nvPr/>
+        </p:nvSpPr>
+        <p:spPr>
+          <a:xfrm>
+            <a:off x="549006" y="5054152"/>
+            <a:ext cx="11369407" cy="1323439"/>
+          </a:xfrm>
+          <a:prstGeom prst="rect">
+            <a:avLst/>
+          </a:prstGeom>
+          <a:noFill/>
+        </p:spPr>
+        <p:txBody>
+          <a:bodyPr wrap="square" rtlCol="0">
+            <a:spAutoFit/>
+          </a:bodyPr>
+          <a:lstStyle/>
+          <a:p>
+            <a:r>
+              <a:rPr lang="en-GB" sz="2000" dirty="0">
+                <a:latin typeface="Arial" panose="020B0604020202020204" pitchFamily="34" charset="0"/>
+                <a:cs typeface="Arial" panose="020B0604020202020204" pitchFamily="34" charset="0"/>
+              </a:rPr>
+              <a:t>Question: </a:t>
+            </a:r>
+          </a:p>
+          <a:p>
+            <a:endParaRPr lang="en-GB" sz="2000" dirty="0">
+              <a:latin typeface="Arial" panose="020B0604020202020204" pitchFamily="34" charset="0"/>
+              <a:cs typeface="Arial" panose="020B0604020202020204" pitchFamily="34" charset="0"/>
+            </a:endParaRPr>
+          </a:p>
+          <a:p>
+            <a:r>
+              <a:rPr lang="en-GB" sz="2000" dirty="0">
+                <a:latin typeface="Arial" panose="020B0604020202020204" pitchFamily="34" charset="0"/>
+                <a:cs typeface="Arial" panose="020B0604020202020204" pitchFamily="34" charset="0"/>
+              </a:rPr>
+              <a:t>What set of sociodemographic and water usage variables have an impact of overall water expenditure bills among Syrian refugees in stationed in camps in Jordan? </a:t>
+            </a:r>
           </a:p>
         </p:txBody>
       </p:sp>
@@ -19956,7 +20468,7 @@
 </p:sld>
 </file>
 
-<file path=ppt/slides/slide21.xml><?xml version="1.0" encoding="utf-8"?>
+<file path=ppt/slides/slide22.xml><?xml version="1.0" encoding="utf-8"?>
 <p:sld xmlns:a="http://schemas.openxmlformats.org/drawingml/2006/main" xmlns:r="http://schemas.openxmlformats.org/officeDocument/2006/relationships" xmlns:p="http://schemas.openxmlformats.org/presentationml/2006/main">
   <p:cSld>
     <p:spTree>
@@ -19973,8 +20485,8 @@
           <a:chExt cx="0" cy="0"/>
         </a:xfrm>
       </p:grpSpPr>
-      <mc:AlternateContent xmlns:mc="http://schemas.openxmlformats.org/markup-compatibility/2006">
-        <mc:Choice xmlns:a14="http://schemas.microsoft.com/office/drawing/2010/main" Requires="a14">
+      <mc:AlternateContent xmlns:mc="http://schemas.openxmlformats.org/markup-compatibility/2006" xmlns:a14="http://schemas.microsoft.com/office/drawing/2010/main">
+        <mc:Choice Requires="a14">
           <p:sp>
             <p:nvSpPr>
               <p:cNvPr id="6" name="TextBox 5">
@@ -20272,7 +20784,7 @@
             </p:txBody>
           </p:sp>
         </mc:Choice>
-        <mc:Fallback>
+        <mc:Fallback xmlns="">
           <p:sp>
             <p:nvSpPr>
               <p:cNvPr id="6" name="TextBox 5">
@@ -20450,8 +20962,8 @@
           </a:p>
         </p:txBody>
       </p:sp>
-      <mc:AlternateContent xmlns:mc="http://schemas.openxmlformats.org/markup-compatibility/2006">
-        <mc:Choice xmlns:a14="http://schemas.microsoft.com/office/drawing/2010/main" Requires="a14">
+      <mc:AlternateContent xmlns:mc="http://schemas.openxmlformats.org/markup-compatibility/2006" xmlns:a14="http://schemas.microsoft.com/office/drawing/2010/main">
+        <mc:Choice Requires="a14">
           <p:sp>
             <p:nvSpPr>
               <p:cNvPr id="10" name="TextBox 9">
@@ -20806,7 +21318,7 @@
             </p:txBody>
           </p:sp>
         </mc:Choice>
-        <mc:Fallback>
+        <mc:Fallback xmlns="">
           <p:sp>
             <p:nvSpPr>
               <p:cNvPr id="10" name="TextBox 9">
@@ -20902,8 +21414,8 @@
           </a:p>
         </p:txBody>
       </p:sp>
-      <mc:AlternateContent xmlns:mc="http://schemas.openxmlformats.org/markup-compatibility/2006">
-        <mc:Choice xmlns:a14="http://schemas.microsoft.com/office/drawing/2010/main" Requires="a14">
+      <mc:AlternateContent xmlns:mc="http://schemas.openxmlformats.org/markup-compatibility/2006" xmlns:a14="http://schemas.microsoft.com/office/drawing/2010/main">
+        <mc:Choice Requires="a14">
           <p:sp>
             <p:nvSpPr>
               <p:cNvPr id="12" name="TextBox 11">
@@ -21343,7 +21855,7 @@
             </p:txBody>
           </p:sp>
         </mc:Choice>
-        <mc:Fallback>
+        <mc:Fallback xmlns="">
           <p:sp>
             <p:nvSpPr>
               <p:cNvPr id="12" name="TextBox 11">
@@ -21638,8 +22150,8 @@
           </p:sp>
         </mc:Fallback>
       </mc:AlternateContent>
-      <mc:AlternateContent xmlns:mc="http://schemas.openxmlformats.org/markup-compatibility/2006">
-        <mc:Choice xmlns:a14="http://schemas.microsoft.com/office/drawing/2010/main" Requires="a14">
+      <mc:AlternateContent xmlns:mc="http://schemas.openxmlformats.org/markup-compatibility/2006" xmlns:a14="http://schemas.microsoft.com/office/drawing/2010/main">
+        <mc:Choice Requires="a14">
           <p:sp>
             <p:nvSpPr>
               <p:cNvPr id="15" name="TextBox 14">
@@ -22210,7 +22722,7 @@
             </p:txBody>
           </p:sp>
         </mc:Choice>
-        <mc:Fallback>
+        <mc:Fallback xmlns="">
           <p:sp>
             <p:nvSpPr>
               <p:cNvPr id="15" name="TextBox 14">
@@ -22722,7 +23234,7 @@
                 <a:cs typeface="ＭＳ Ｐゴシック" charset="0"/>
               </a:rPr>
               <a:pPr eaLnBrk="1" hangingPunct="1"/>
-              <a:t>21</a:t>
+              <a:t>22</a:t>
             </a:fld>
             <a:endParaRPr lang="en-US" dirty="0">
               <a:solidFill>
@@ -22776,7 +23288,7 @@
 </p:sld>
 </file>
 
-<file path=ppt/slides/slide22.xml><?xml version="1.0" encoding="utf-8"?>
+<file path=ppt/slides/slide23.xml><?xml version="1.0" encoding="utf-8"?>
 <p:sld xmlns:a="http://schemas.openxmlformats.org/drawingml/2006/main" xmlns:r="http://schemas.openxmlformats.org/officeDocument/2006/relationships" xmlns:p="http://schemas.openxmlformats.org/presentationml/2006/main">
   <p:cSld>
     <p:spTree>
@@ -22793,8 +23305,8 @@
           <a:chExt cx="0" cy="0"/>
         </a:xfrm>
       </p:grpSpPr>
-      <mc:AlternateContent xmlns:mc="http://schemas.openxmlformats.org/markup-compatibility/2006" xmlns:a14="http://schemas.microsoft.com/office/drawing/2010/main">
-        <mc:Choice Requires="a14">
+      <mc:AlternateContent xmlns:mc="http://schemas.openxmlformats.org/markup-compatibility/2006">
+        <mc:Choice xmlns:a14="http://schemas.microsoft.com/office/drawing/2010/main" Requires="a14">
           <p:sp>
             <p:nvSpPr>
               <p:cNvPr id="2" name="TextBox 1">
@@ -23086,6 +23598,64 @@
                           </m:r>
                         </m:sub>
                       </m:sSub>
+                      <m:r>
+                        <a:rPr lang="en-GB" sz="1600" b="0" i="1" smtClean="0">
+                          <a:latin typeface="Cambria Math" panose="02040503050406030204" pitchFamily="18" charset="0"/>
+                        </a:rPr>
+                        <m:t>+</m:t>
+                      </m:r>
+                      <m:sSub>
+                        <m:sSubPr>
+                          <m:ctrlPr>
+                            <a:rPr lang="en-GB" sz="1600" i="1">
+                              <a:latin typeface="Cambria Math" panose="02040503050406030204" pitchFamily="18" charset="0"/>
+                            </a:rPr>
+                          </m:ctrlPr>
+                        </m:sSubPr>
+                        <m:e>
+                          <m:r>
+                            <a:rPr lang="en-GB" sz="1600" i="1">
+                              <a:latin typeface="Cambria Math" panose="02040503050406030204" pitchFamily="18" charset="0"/>
+                              <a:ea typeface="Cambria Math" panose="02040503050406030204" pitchFamily="18" charset="0"/>
+                            </a:rPr>
+                            <m:t>𝛽</m:t>
+                          </m:r>
+                        </m:e>
+                        <m:sub>
+                          <m:r>
+                            <a:rPr lang="en-GB" sz="1600" b="0" i="0" smtClean="0">
+                              <a:latin typeface="Cambria Math" panose="02040503050406030204" pitchFamily="18" charset="0"/>
+                              <a:ea typeface="Cambria Math" panose="02040503050406030204" pitchFamily="18" charset="0"/>
+                            </a:rPr>
+                            <m:t>3</m:t>
+                          </m:r>
+                        </m:sub>
+                      </m:sSub>
+                      <m:sSub>
+                        <m:sSubPr>
+                          <m:ctrlPr>
+                            <a:rPr lang="en-GB" sz="1600" i="1">
+                              <a:latin typeface="Cambria Math" panose="02040503050406030204" pitchFamily="18" charset="0"/>
+                            </a:rPr>
+                          </m:ctrlPr>
+                        </m:sSubPr>
+                        <m:e>
+                          <m:r>
+                            <a:rPr lang="en-GB" sz="1600" i="1">
+                              <a:latin typeface="Cambria Math" panose="02040503050406030204" pitchFamily="18" charset="0"/>
+                            </a:rPr>
+                            <m:t>𝑥</m:t>
+                          </m:r>
+                        </m:e>
+                        <m:sub>
+                          <m:r>
+                            <a:rPr lang="en-GB" sz="1600" b="0" i="1" smtClean="0">
+                              <a:latin typeface="Cambria Math" panose="02040503050406030204" pitchFamily="18" charset="0"/>
+                            </a:rPr>
+                            <m:t>3</m:t>
+                          </m:r>
+                        </m:sub>
+                      </m:sSub>
                     </m:oMath>
                   </m:oMathPara>
                 </a14:m>
@@ -23097,7 +23667,7 @@
             </p:txBody>
           </p:sp>
         </mc:Choice>
-        <mc:Fallback xmlns="">
+        <mc:Fallback>
           <p:sp>
             <p:nvSpPr>
               <p:cNvPr id="2" name="TextBox 1">
@@ -23150,8 +23720,8 @@
           </p:sp>
         </mc:Fallback>
       </mc:AlternateContent>
-      <mc:AlternateContent xmlns:mc="http://schemas.openxmlformats.org/markup-compatibility/2006">
-        <mc:Choice xmlns:a14="http://schemas.microsoft.com/office/drawing/2010/main" Requires="a14">
+      <mc:AlternateContent xmlns:mc="http://schemas.openxmlformats.org/markup-compatibility/2006" xmlns:a14="http://schemas.microsoft.com/office/drawing/2010/main">
+        <mc:Choice Requires="a14">
           <p:sp>
             <p:nvSpPr>
               <p:cNvPr id="3" name="TextBox 2">
@@ -23591,7 +24161,7 @@
             </p:txBody>
           </p:sp>
         </mc:Choice>
-        <mc:Fallback>
+        <mc:Fallback xmlns="">
           <p:sp>
             <p:nvSpPr>
               <p:cNvPr id="3" name="TextBox 2">
@@ -24958,8 +25528,8 @@
           </a:fontRef>
         </p:style>
       </p:cxnSp>
-      <mc:AlternateContent xmlns:mc="http://schemas.openxmlformats.org/markup-compatibility/2006" xmlns:a14="http://schemas.microsoft.com/office/drawing/2010/main">
-        <mc:Choice Requires="a14">
+      <mc:AlternateContent xmlns:mc="http://schemas.openxmlformats.org/markup-compatibility/2006">
+        <mc:Choice xmlns:a14="http://schemas.microsoft.com/office/drawing/2010/main" Requires="a14">
           <p:sp>
             <p:nvSpPr>
               <p:cNvPr id="36" name="TextBox 35">
@@ -24974,7 +25544,7 @@
             </p:nvSpPr>
             <p:spPr>
               <a:xfrm>
-                <a:off x="6212648" y="4630182"/>
+                <a:off x="6212648" y="4579110"/>
                 <a:ext cx="2754086" cy="830997"/>
               </a:xfrm>
               <a:prstGeom prst="rect">
@@ -25057,7 +25627,7 @@
             </p:txBody>
           </p:sp>
         </mc:Choice>
-        <mc:Fallback xmlns="">
+        <mc:Fallback>
           <p:sp>
             <p:nvSpPr>
               <p:cNvPr id="36" name="TextBox 35">
@@ -25074,7 +25644,7 @@
             </p:nvSpPr>
             <p:spPr>
               <a:xfrm>
-                <a:off x="6212648" y="4630182"/>
+                <a:off x="6212648" y="4579110"/>
                 <a:ext cx="2754086" cy="830997"/>
               </a:xfrm>
               <a:prstGeom prst="rect">
@@ -25083,7 +25653,7 @@
               <a:blipFill>
                 <a:blip r:embed="rId10"/>
                 <a:stretch>
-                  <a:fillRect l="-1376" t="-1493" b="-7463"/>
+                  <a:fillRect l="-1376" t="-1515" b="-10606"/>
                 </a:stretch>
               </a:blipFill>
             </p:spPr>
@@ -25707,7 +26277,7 @@
                 <a:cs typeface="ＭＳ Ｐゴシック" charset="0"/>
               </a:rPr>
               <a:pPr eaLnBrk="1" hangingPunct="1"/>
-              <a:t>22</a:t>
+              <a:t>23</a:t>
             </a:fld>
             <a:endParaRPr lang="en-US" dirty="0">
               <a:solidFill>
@@ -26214,8 +26784,8 @@
           </a:p>
         </p:txBody>
       </p:sp>
-      <mc:AlternateContent xmlns:mc="http://schemas.openxmlformats.org/markup-compatibility/2006">
-        <mc:Choice xmlns:a14="http://schemas.microsoft.com/office/drawing/2010/main" Requires="a14">
+      <mc:AlternateContent xmlns:mc="http://schemas.openxmlformats.org/markup-compatibility/2006" xmlns:a14="http://schemas.microsoft.com/office/drawing/2010/main">
+        <mc:Choice Requires="a14">
           <p:sp>
             <p:nvSpPr>
               <p:cNvPr id="5" name="TextBox 4">
@@ -26317,7 +26887,7 @@
             </p:txBody>
           </p:sp>
         </mc:Choice>
-        <mc:Fallback>
+        <mc:Fallback xmlns="">
           <p:sp>
             <p:nvSpPr>
               <p:cNvPr id="5" name="TextBox 4">
@@ -26375,7 +26945,7 @@
 </p:sld>
 </file>
 
-<file path=ppt/slides/slide23.xml><?xml version="1.0" encoding="utf-8"?>
+<file path=ppt/slides/slide24.xml><?xml version="1.0" encoding="utf-8"?>
 <p:sld xmlns:a="http://schemas.openxmlformats.org/drawingml/2006/main" xmlns:r="http://schemas.openxmlformats.org/officeDocument/2006/relationships" xmlns:p="http://schemas.openxmlformats.org/presentationml/2006/main">
   <p:cSld>
     <p:spTree>
@@ -26690,7 +27260,7 @@
                 <a:cs typeface="ＭＳ Ｐゴシック" charset="0"/>
               </a:rPr>
               <a:pPr eaLnBrk="1" hangingPunct="1"/>
-              <a:t>23</a:t>
+              <a:t>24</a:t>
             </a:fld>
             <a:endParaRPr lang="en-US" dirty="0">
               <a:solidFill>
@@ -26698,6 +27268,324 @@
               </a:solidFill>
               <a:cs typeface="ＭＳ Ｐゴシック" charset="0"/>
             </a:endParaRPr>
+          </a:p>
+        </p:txBody>
+      </p:sp>
+      <p:sp>
+        <p:nvSpPr>
+          <p:cNvPr id="4" name="TextBox 3">
+            <a:extLst>
+              <a:ext uri="{FF2B5EF4-FFF2-40B4-BE49-F238E27FC236}">
+                <a16:creationId xmlns:a16="http://schemas.microsoft.com/office/drawing/2014/main" id="{210D74F0-3261-D0BA-FA59-43C8A3E97648}"/>
+              </a:ext>
+            </a:extLst>
+          </p:cNvPr>
+          <p:cNvSpPr txBox="1"/>
+          <p:nvPr/>
+        </p:nvSpPr>
+        <p:spPr>
+          <a:xfrm>
+            <a:off x="1972018" y="2886419"/>
+            <a:ext cx="479618" cy="230832"/>
+          </a:xfrm>
+          <a:prstGeom prst="rect">
+            <a:avLst/>
+          </a:prstGeom>
+          <a:noFill/>
+        </p:spPr>
+        <p:txBody>
+          <a:bodyPr wrap="none" rtlCol="0">
+            <a:spAutoFit/>
+          </a:bodyPr>
+          <a:lstStyle/>
+          <a:p>
+            <a:r>
+              <a:rPr lang="en-GB" sz="900" dirty="0">
+                <a:latin typeface="Arial" panose="020B0604020202020204" pitchFamily="34" charset="0"/>
+                <a:cs typeface="Arial" panose="020B0604020202020204" pitchFamily="34" charset="0"/>
+              </a:rPr>
+              <a:t>(</a:t>
+            </a:r>
+            <a:r>
+              <a:rPr lang="en-GB" sz="900" dirty="0" err="1">
+                <a:latin typeface="Arial" panose="020B0604020202020204" pitchFamily="34" charset="0"/>
+                <a:cs typeface="Arial" panose="020B0604020202020204" pitchFamily="34" charset="0"/>
+              </a:rPr>
+              <a:t>cont</a:t>
+            </a:r>
+            <a:r>
+              <a:rPr lang="en-GB" sz="900" dirty="0">
+                <a:latin typeface="Arial" panose="020B0604020202020204" pitchFamily="34" charset="0"/>
+                <a:cs typeface="Arial" panose="020B0604020202020204" pitchFamily="34" charset="0"/>
+              </a:rPr>
+              <a:t>)</a:t>
+            </a:r>
+          </a:p>
+        </p:txBody>
+      </p:sp>
+      <p:sp>
+        <p:nvSpPr>
+          <p:cNvPr id="5" name="TextBox 4">
+            <a:extLst>
+              <a:ext uri="{FF2B5EF4-FFF2-40B4-BE49-F238E27FC236}">
+                <a16:creationId xmlns:a16="http://schemas.microsoft.com/office/drawing/2014/main" id="{6D7AFC56-2651-CF42-7D5F-7D5D710363CE}"/>
+              </a:ext>
+            </a:extLst>
+          </p:cNvPr>
+          <p:cNvSpPr txBox="1"/>
+          <p:nvPr/>
+        </p:nvSpPr>
+        <p:spPr>
+          <a:xfrm>
+            <a:off x="791378" y="1559543"/>
+            <a:ext cx="415498" cy="230832"/>
+          </a:xfrm>
+          <a:prstGeom prst="rect">
+            <a:avLst/>
+          </a:prstGeom>
+          <a:noFill/>
+        </p:spPr>
+        <p:txBody>
+          <a:bodyPr wrap="none" rtlCol="0">
+            <a:spAutoFit/>
+          </a:bodyPr>
+          <a:lstStyle/>
+          <a:p>
+            <a:r>
+              <a:rPr lang="en-GB" sz="900" dirty="0">
+                <a:latin typeface="Arial" panose="020B0604020202020204" pitchFamily="34" charset="0"/>
+                <a:cs typeface="Arial" panose="020B0604020202020204" pitchFamily="34" charset="0"/>
+              </a:rPr>
+              <a:t>(cat)</a:t>
+            </a:r>
+          </a:p>
+        </p:txBody>
+      </p:sp>
+      <p:sp>
+        <p:nvSpPr>
+          <p:cNvPr id="8" name="TextBox 7">
+            <a:extLst>
+              <a:ext uri="{FF2B5EF4-FFF2-40B4-BE49-F238E27FC236}">
+                <a16:creationId xmlns:a16="http://schemas.microsoft.com/office/drawing/2014/main" id="{FACDF9AF-ABD1-F512-2A14-3743A2E65F50}"/>
+              </a:ext>
+            </a:extLst>
+          </p:cNvPr>
+          <p:cNvSpPr txBox="1"/>
+          <p:nvPr/>
+        </p:nvSpPr>
+        <p:spPr>
+          <a:xfrm>
+            <a:off x="1862431" y="2091368"/>
+            <a:ext cx="415498" cy="230832"/>
+          </a:xfrm>
+          <a:prstGeom prst="rect">
+            <a:avLst/>
+          </a:prstGeom>
+          <a:noFill/>
+        </p:spPr>
+        <p:txBody>
+          <a:bodyPr wrap="none" rtlCol="0">
+            <a:spAutoFit/>
+          </a:bodyPr>
+          <a:lstStyle/>
+          <a:p>
+            <a:r>
+              <a:rPr lang="en-GB" sz="900" dirty="0">
+                <a:latin typeface="Arial" panose="020B0604020202020204" pitchFamily="34" charset="0"/>
+                <a:cs typeface="Arial" panose="020B0604020202020204" pitchFamily="34" charset="0"/>
+              </a:rPr>
+              <a:t>(cat)</a:t>
+            </a:r>
+          </a:p>
+        </p:txBody>
+      </p:sp>
+      <p:sp>
+        <p:nvSpPr>
+          <p:cNvPr id="10" name="TextBox 9">
+            <a:extLst>
+              <a:ext uri="{FF2B5EF4-FFF2-40B4-BE49-F238E27FC236}">
+                <a16:creationId xmlns:a16="http://schemas.microsoft.com/office/drawing/2014/main" id="{B6417373-419D-693E-8043-B1CDD66686C2}"/>
+              </a:ext>
+            </a:extLst>
+          </p:cNvPr>
+          <p:cNvSpPr txBox="1"/>
+          <p:nvPr/>
+        </p:nvSpPr>
+        <p:spPr>
+          <a:xfrm>
+            <a:off x="1184842" y="3165357"/>
+            <a:ext cx="415498" cy="230832"/>
+          </a:xfrm>
+          <a:prstGeom prst="rect">
+            <a:avLst/>
+          </a:prstGeom>
+          <a:noFill/>
+        </p:spPr>
+        <p:txBody>
+          <a:bodyPr wrap="none" rtlCol="0">
+            <a:spAutoFit/>
+          </a:bodyPr>
+          <a:lstStyle/>
+          <a:p>
+            <a:r>
+              <a:rPr lang="en-GB" sz="900" dirty="0">
+                <a:latin typeface="Arial" panose="020B0604020202020204" pitchFamily="34" charset="0"/>
+                <a:cs typeface="Arial" panose="020B0604020202020204" pitchFamily="34" charset="0"/>
+              </a:rPr>
+              <a:t>(cat)</a:t>
+            </a:r>
+          </a:p>
+        </p:txBody>
+      </p:sp>
+      <p:sp>
+        <p:nvSpPr>
+          <p:cNvPr id="11" name="TextBox 10">
+            <a:extLst>
+              <a:ext uri="{FF2B5EF4-FFF2-40B4-BE49-F238E27FC236}">
+                <a16:creationId xmlns:a16="http://schemas.microsoft.com/office/drawing/2014/main" id="{197C4860-7EF9-505C-BE08-69D97F643620}"/>
+              </a:ext>
+            </a:extLst>
+          </p:cNvPr>
+          <p:cNvSpPr txBox="1"/>
+          <p:nvPr/>
+        </p:nvSpPr>
+        <p:spPr>
+          <a:xfrm>
+            <a:off x="2024541" y="4083585"/>
+            <a:ext cx="415498" cy="230832"/>
+          </a:xfrm>
+          <a:prstGeom prst="rect">
+            <a:avLst/>
+          </a:prstGeom>
+          <a:noFill/>
+        </p:spPr>
+        <p:txBody>
+          <a:bodyPr wrap="none" rtlCol="0">
+            <a:spAutoFit/>
+          </a:bodyPr>
+          <a:lstStyle/>
+          <a:p>
+            <a:r>
+              <a:rPr lang="en-GB" sz="900" dirty="0">
+                <a:latin typeface="Arial" panose="020B0604020202020204" pitchFamily="34" charset="0"/>
+                <a:cs typeface="Arial" panose="020B0604020202020204" pitchFamily="34" charset="0"/>
+              </a:rPr>
+              <a:t>(cat)</a:t>
+            </a:r>
+          </a:p>
+        </p:txBody>
+      </p:sp>
+      <p:sp>
+        <p:nvSpPr>
+          <p:cNvPr id="12" name="TextBox 11">
+            <a:extLst>
+              <a:ext uri="{FF2B5EF4-FFF2-40B4-BE49-F238E27FC236}">
+                <a16:creationId xmlns:a16="http://schemas.microsoft.com/office/drawing/2014/main" id="{824EDFBC-3CEF-8A54-A8F2-9DC41B06F9DA}"/>
+              </a:ext>
+            </a:extLst>
+          </p:cNvPr>
+          <p:cNvSpPr txBox="1"/>
+          <p:nvPr/>
+        </p:nvSpPr>
+        <p:spPr>
+          <a:xfrm>
+            <a:off x="1999945" y="4731273"/>
+            <a:ext cx="415498" cy="230832"/>
+          </a:xfrm>
+          <a:prstGeom prst="rect">
+            <a:avLst/>
+          </a:prstGeom>
+          <a:noFill/>
+        </p:spPr>
+        <p:txBody>
+          <a:bodyPr wrap="none" rtlCol="0">
+            <a:spAutoFit/>
+          </a:bodyPr>
+          <a:lstStyle/>
+          <a:p>
+            <a:r>
+              <a:rPr lang="en-GB" sz="900" dirty="0">
+                <a:latin typeface="Arial" panose="020B0604020202020204" pitchFamily="34" charset="0"/>
+                <a:cs typeface="Arial" panose="020B0604020202020204" pitchFamily="34" charset="0"/>
+              </a:rPr>
+              <a:t>(cat)</a:t>
+            </a:r>
+          </a:p>
+        </p:txBody>
+      </p:sp>
+      <p:sp>
+        <p:nvSpPr>
+          <p:cNvPr id="13" name="TextBox 12">
+            <a:extLst>
+              <a:ext uri="{FF2B5EF4-FFF2-40B4-BE49-F238E27FC236}">
+                <a16:creationId xmlns:a16="http://schemas.microsoft.com/office/drawing/2014/main" id="{C5C0569C-36B8-ABC4-9432-5178794DACFB}"/>
+              </a:ext>
+            </a:extLst>
+          </p:cNvPr>
+          <p:cNvSpPr txBox="1"/>
+          <p:nvPr/>
+        </p:nvSpPr>
+        <p:spPr>
+          <a:xfrm>
+            <a:off x="2046761" y="5280751"/>
+            <a:ext cx="415498" cy="230832"/>
+          </a:xfrm>
+          <a:prstGeom prst="rect">
+            <a:avLst/>
+          </a:prstGeom>
+          <a:noFill/>
+        </p:spPr>
+        <p:txBody>
+          <a:bodyPr wrap="none" rtlCol="0">
+            <a:spAutoFit/>
+          </a:bodyPr>
+          <a:lstStyle/>
+          <a:p>
+            <a:r>
+              <a:rPr lang="en-GB" sz="900" dirty="0">
+                <a:latin typeface="Arial" panose="020B0604020202020204" pitchFamily="34" charset="0"/>
+                <a:cs typeface="Arial" panose="020B0604020202020204" pitchFamily="34" charset="0"/>
+              </a:rPr>
+              <a:t>(cat)</a:t>
+            </a:r>
+          </a:p>
+        </p:txBody>
+      </p:sp>
+      <p:sp>
+        <p:nvSpPr>
+          <p:cNvPr id="14" name="TextBox 13">
+            <a:extLst>
+              <a:ext uri="{FF2B5EF4-FFF2-40B4-BE49-F238E27FC236}">
+                <a16:creationId xmlns:a16="http://schemas.microsoft.com/office/drawing/2014/main" id="{F8B20D26-3546-0BDA-8DD9-47E2D9EBD4E0}"/>
+              </a:ext>
+            </a:extLst>
+          </p:cNvPr>
+          <p:cNvSpPr txBox="1"/>
+          <p:nvPr/>
+        </p:nvSpPr>
+        <p:spPr>
+          <a:xfrm>
+            <a:off x="1206876" y="5819419"/>
+            <a:ext cx="415498" cy="230832"/>
+          </a:xfrm>
+          <a:prstGeom prst="rect">
+            <a:avLst/>
+          </a:prstGeom>
+          <a:noFill/>
+        </p:spPr>
+        <p:txBody>
+          <a:bodyPr wrap="none" rtlCol="0">
+            <a:spAutoFit/>
+          </a:bodyPr>
+          <a:lstStyle/>
+          <a:p>
+            <a:r>
+              <a:rPr lang="en-GB" sz="900" dirty="0">
+                <a:latin typeface="Arial" panose="020B0604020202020204" pitchFamily="34" charset="0"/>
+                <a:cs typeface="Arial" panose="020B0604020202020204" pitchFamily="34" charset="0"/>
+              </a:rPr>
+              <a:t>(cat)</a:t>
+            </a:r>
           </a:p>
         </p:txBody>
       </p:sp>
@@ -26714,7 +27602,7 @@
 </p:sld>
 </file>
 
-<file path=ppt/slides/slide24.xml><?xml version="1.0" encoding="utf-8"?>
+<file path=ppt/slides/slide25.xml><?xml version="1.0" encoding="utf-8"?>
 <p:sld xmlns:a="http://schemas.openxmlformats.org/drawingml/2006/main" xmlns:r="http://schemas.openxmlformats.org/officeDocument/2006/relationships" xmlns:p="http://schemas.openxmlformats.org/presentationml/2006/main" showMasterSp="0">
   <p:cSld>
     <p:spTree>
@@ -26904,7 +27792,7 @@
                 <a:cs typeface="ＭＳ Ｐゴシック" charset="0"/>
               </a:rPr>
               <a:pPr eaLnBrk="1" hangingPunct="1"/>
-              <a:t>24</a:t>
+              <a:t>25</a:t>
             </a:fld>
             <a:endParaRPr lang="en-US" dirty="0">
               <a:solidFill>
@@ -28299,22 +29187,21 @@
                 <a:latin typeface="Helvetica Neue Thin" panose="020B0403020202020204" pitchFamily="34" charset="0"/>
                 <a:ea typeface="Helvetica Neue Thin" panose="020B0403020202020204" pitchFamily="34" charset="0"/>
               </a:rPr>
-              <a:t>Notes 2: We mentioned that a linear regression model such as the above formula allows the user to quantify the relationship (or association) between an outcome (i.e. dependent variable) with one, or more predictors (i.e., independent variable(s))</a:t>
+              <a:t>Notes 2: We mentioned that a linear regression model such as the above formula allows the user to quantify the relationship (or association) between a </a:t>
             </a:r>
-          </a:p>
-          <a:p>
-            <a:endParaRPr lang="en-GB" sz="1200" dirty="0">
-              <a:latin typeface="Helvetica Neue Thin" panose="020B0403020202020204" pitchFamily="34" charset="0"/>
-              <a:ea typeface="Helvetica Neue Thin" panose="020B0403020202020204" pitchFamily="34" charset="0"/>
-            </a:endParaRPr>
-          </a:p>
-          <a:p>
+            <a:r>
+              <a:rPr lang="en-GB" sz="1200" b="1" u="sng" dirty="0">
+                <a:latin typeface="Helvetica Neue Thin" panose="020B0403020202020204" pitchFamily="34" charset="0"/>
+                <a:ea typeface="Helvetica Neue Thin" panose="020B0403020202020204" pitchFamily="34" charset="0"/>
+              </a:rPr>
+              <a:t>continuous</a:t>
+            </a:r>
             <a:r>
               <a:rPr lang="en-GB" sz="1200" dirty="0">
                 <a:latin typeface="Helvetica Neue Thin" panose="020B0403020202020204" pitchFamily="34" charset="0"/>
                 <a:ea typeface="Helvetica Neue Thin" panose="020B0403020202020204" pitchFamily="34" charset="0"/>
               </a:rPr>
-              <a:t>These models are good causal and predictive inference</a:t>
+              <a:t> outcome (i.e. dependent variable) with one, or more predictors (i.e., independent variable(s)). These models are good for making causal and predictive inference</a:t>
             </a:r>
           </a:p>
         </p:txBody>
@@ -28640,14 +29527,14 @@
           <p:nvPr>
             <p:extLst>
               <p:ext uri="{D42A27DB-BD31-4B8C-83A1-F6EECF244321}">
-                <p14:modId xmlns:p14="http://schemas.microsoft.com/office/powerpoint/2010/main" val="3523635472"/>
+                <p14:modId xmlns:p14="http://schemas.microsoft.com/office/powerpoint/2010/main" val="1428730"/>
               </p:ext>
             </p:extLst>
           </p:nvPr>
         </p:nvGraphicFramePr>
         <p:xfrm>
           <a:off x="214312" y="2034116"/>
-          <a:ext cx="11763375" cy="4456012"/>
+          <a:ext cx="11763375" cy="4391574"/>
         </p:xfrm>
         <a:graphic>
           <a:graphicData uri="http://schemas.openxmlformats.org/drawingml/2006/table">
@@ -28671,7 +29558,7 @@
                   </a:extLst>
                 </a:gridCol>
               </a:tblGrid>
-              <a:tr h="450461">
+              <a:tr h="440550">
                 <a:tc>
                   <a:txBody>
                     <a:bodyPr/>
@@ -28784,7 +29671,7 @@
                   </a:ext>
                 </a:extLst>
               </a:tr>
-              <a:tr h="734873">
+              <a:tr h="718704">
                 <a:tc>
                   <a:txBody>
                     <a:bodyPr/>
@@ -28895,7 +29782,7 @@
                   </a:ext>
                 </a:extLst>
               </a:tr>
-              <a:tr h="694651">
+              <a:tr h="679367">
                 <a:tc>
                   <a:txBody>
                     <a:bodyPr/>
@@ -29006,7 +29893,7 @@
                   </a:ext>
                 </a:extLst>
               </a:tr>
-              <a:tr h="972781">
+              <a:tr h="951377">
                 <a:tc>
                   <a:txBody>
                     <a:bodyPr/>
@@ -29117,7 +30004,7 @@
                   </a:ext>
                 </a:extLst>
               </a:tr>
-              <a:tr h="658366">
+              <a:tr h="643880">
                 <a:tc>
                   <a:txBody>
                     <a:bodyPr/>
@@ -29228,7 +30115,7 @@
                   </a:ext>
                 </a:extLst>
               </a:tr>
-              <a:tr h="421585">
+              <a:tr h="924090">
                 <a:tc>
                   <a:txBody>
                     <a:bodyPr/>
@@ -29454,7 +30341,7 @@
                 <a:latin typeface="Helvetica Neue Thin" panose="020B0403020202020204" pitchFamily="34" charset="0"/>
                 <a:ea typeface="Helvetica Neue Thin" panose="020B0403020202020204" pitchFamily="34" charset="0"/>
               </a:rPr>
-              <a:t>Notes 1: Recall that we described how linear regression models are best modelling outcomes that are only continuous measure, where by we made the assumption that such continuous measures are from a Gaussian/normal distribution. Before, deep diving into spatial lag and error regression models… because are from the family of linear models but a spatial component to it. </a:t>
+              <a:t>Notes 1: Recall that we described how linear regression models are best suited for modelling outcomes that are only continuous measures, whereby we assumed that such continuous measures are from a Gaussian/normal distribution. Before, deep diving into spatial lag and error regression models… because are from the family of linear models but a spatial component to it. </a:t>
             </a:r>
           </a:p>
           <a:p>
@@ -30572,7 +31459,7 @@
         <p:spPr>
           <a:xfrm>
             <a:off x="7820595" y="465915"/>
-            <a:ext cx="4157092" cy="769441"/>
+            <a:ext cx="4157092" cy="600164"/>
           </a:xfrm>
           <a:prstGeom prst="rect">
             <a:avLst/>
@@ -30594,7 +31481,7 @@
                 <a:latin typeface="Helvetica Neue Thin" panose="020B0403020202020204" pitchFamily="34" charset="0"/>
                 <a:ea typeface="Helvetica Neue Thin" panose="020B0403020202020204" pitchFamily="34" charset="0"/>
               </a:rPr>
-              <a:t>Notes 1: Recall that we only touched on the fact the outcomes can measures that are from a different distribution, but we never really touched on this matter and on these particular classes of regression models</a:t>
+              <a:t>Notes 1: Recall that we only touched on outcomes that can follow a different distribution, and models can potentially be violated if the inappropriate outcome is fitted into the wrong model! </a:t>
             </a:r>
           </a:p>
         </p:txBody>
@@ -30957,7 +31844,27 @@
                 <a:latin typeface="Helvetica Neue Light" panose="02000403000000020004" pitchFamily="2" charset="0"/>
                 <a:ea typeface="Helvetica Neue Light" panose="02000403000000020004" pitchFamily="2" charset="0"/>
               </a:rPr>
-              <a:t>What are Generalized Linear Models?</a:t>
+              <a:t>What are </a:t>
+            </a:r>
+            <a:r>
+              <a:rPr lang="en-US" sz="3600" b="1" dirty="0" err="1">
+                <a:solidFill>
+                  <a:schemeClr val="bg1"/>
+                </a:solidFill>
+                <a:latin typeface="Helvetica Neue Light" panose="02000403000000020004" pitchFamily="2" charset="0"/>
+                <a:ea typeface="Helvetica Neue Light" panose="02000403000000020004" pitchFamily="2" charset="0"/>
+              </a:rPr>
+              <a:t>Generalised</a:t>
+            </a:r>
+            <a:r>
+              <a:rPr lang="en-US" sz="3600" b="1" dirty="0">
+                <a:solidFill>
+                  <a:schemeClr val="bg1"/>
+                </a:solidFill>
+                <a:latin typeface="Helvetica Neue Light" panose="02000403000000020004" pitchFamily="2" charset="0"/>
+                <a:ea typeface="Helvetica Neue Light" panose="02000403000000020004" pitchFamily="2" charset="0"/>
+              </a:rPr>
+              <a:t> Linear Models (GLMs)?</a:t>
             </a:r>
           </a:p>
         </p:txBody>
@@ -31228,8 +32135,8 @@
           </a:p>
         </p:txBody>
       </p:sp>
-      <mc:AlternateContent xmlns:mc="http://schemas.openxmlformats.org/markup-compatibility/2006" xmlns:a14="http://schemas.microsoft.com/office/drawing/2010/main">
-        <mc:Choice Requires="a14">
+      <mc:AlternateContent xmlns:mc="http://schemas.openxmlformats.org/markup-compatibility/2006">
+        <mc:Choice xmlns:a14="http://schemas.microsoft.com/office/drawing/2010/main" Requires="a14">
           <p:sp>
             <p:nvSpPr>
               <p:cNvPr id="4" name="Title 1">
@@ -31278,7 +32185,7 @@
                     <a:ea typeface="Helvetica Neue Light" panose="02000403000000020004" pitchFamily="2" charset="0"/>
                     <a:cs typeface="Helvetica Neue" panose="02000503000000020004" pitchFamily="2" charset="0"/>
                   </a:rPr>
-                  <a:t>Generalized linear model (GLMs) is a flexible generalization of ordinary linear regression model, which allows the user to link some outcome </a:t>
+                  <a:t>Generalised linear model (GLMs) is a flexible generalisation of ordinary linear regression model, which allows the user to link some outcome </a:t>
                 </a:r>
                 <a:r>
                   <a:rPr lang="en-GB" sz="1800" i="1" dirty="0">
@@ -31399,7 +32306,7 @@
                   <a:buChar char="§"/>
                 </a:pPr>
                 <a:r>
-                  <a:rPr lang="en-GB" sz="1800" dirty="0">
+                  <a:rPr lang="en-GB" sz="1800" u="sng" dirty="0">
                     <a:latin typeface="Helvetica Neue Light" panose="02000403000000020004" pitchFamily="2" charset="0"/>
                     <a:ea typeface="Helvetica Neue Light" panose="02000403000000020004" pitchFamily="2" charset="0"/>
                     <a:cs typeface="Helvetica Neue" panose="02000503000000020004" pitchFamily="2" charset="0"/>
@@ -31413,12 +32320,26 @@
                   <a:buChar char="§"/>
                 </a:pPr>
                 <a:r>
-                  <a:rPr lang="en-GB" sz="1800" dirty="0">
+                  <a:rPr lang="en-GB" sz="1800" u="sng" dirty="0">
                     <a:latin typeface="Helvetica Neue Light" panose="02000403000000020004" pitchFamily="2" charset="0"/>
                     <a:ea typeface="Helvetica Neue Light" panose="02000403000000020004" pitchFamily="2" charset="0"/>
                     <a:cs typeface="Helvetica Neue" panose="02000503000000020004" pitchFamily="2" charset="0"/>
                   </a:rPr>
-                  <a:t>Binomial</a:t>
+                  <a:t>Bernoulli (binary category)</a:t>
+                </a:r>
+              </a:p>
+              <a:p>
+                <a:pPr marL="285750" indent="-285750">
+                  <a:buFont typeface="Wingdings" pitchFamily="2" charset="2"/>
+                  <a:buChar char="§"/>
+                </a:pPr>
+                <a:r>
+                  <a:rPr lang="en-GB" sz="1800" u="sng" dirty="0">
+                    <a:latin typeface="Helvetica Neue Light" panose="02000403000000020004" pitchFamily="2" charset="0"/>
+                    <a:ea typeface="Helvetica Neue Light" panose="02000403000000020004" pitchFamily="2" charset="0"/>
+                    <a:cs typeface="Helvetica Neue" panose="02000503000000020004" pitchFamily="2" charset="0"/>
+                  </a:rPr>
+                  <a:t>Binomial (aggregated binary)</a:t>
                 </a:r>
               </a:p>
               <a:p>
@@ -31432,7 +32353,7 @@
                     <a:ea typeface="Helvetica Neue Light" panose="02000403000000020004" pitchFamily="2" charset="0"/>
                     <a:cs typeface="Helvetica Neue" panose="02000503000000020004" pitchFamily="2" charset="0"/>
                   </a:rPr>
-                  <a:t>Poisson </a:t>
+                  <a:t>Multinomial (multiple categories)</a:t>
                 </a:r>
               </a:p>
               <a:p>
@@ -31441,12 +32362,12 @@
                   <a:buChar char="§"/>
                 </a:pPr>
                 <a:r>
-                  <a:rPr lang="en-GB" sz="1800" dirty="0">
+                  <a:rPr lang="en-GB" sz="1800" u="sng" dirty="0">
                     <a:latin typeface="Helvetica Neue Light" panose="02000403000000020004" pitchFamily="2" charset="0"/>
                     <a:ea typeface="Helvetica Neue Light" panose="02000403000000020004" pitchFamily="2" charset="0"/>
                     <a:cs typeface="Helvetica Neue" panose="02000503000000020004" pitchFamily="2" charset="0"/>
                   </a:rPr>
-                  <a:t>Multinomial </a:t>
+                  <a:t>Poisson (counts) </a:t>
                 </a:r>
               </a:p>
               <a:p>
@@ -31455,12 +32376,12 @@
                   <a:buChar char="§"/>
                 </a:pPr>
                 <a:r>
-                  <a:rPr lang="en-GB" sz="1800" dirty="0">
+                  <a:rPr lang="en-GB" sz="1800" u="sng" dirty="0">
                     <a:latin typeface="Helvetica Neue Light" panose="02000403000000020004" pitchFamily="2" charset="0"/>
                     <a:ea typeface="Helvetica Neue Light" panose="02000403000000020004" pitchFamily="2" charset="0"/>
                     <a:cs typeface="Helvetica Neue" panose="02000503000000020004" pitchFamily="2" charset="0"/>
                   </a:rPr>
-                  <a:t>Negative binomial </a:t>
+                  <a:t>Negative binomial (counts with overdispersion) </a:t>
                 </a:r>
               </a:p>
               <a:p>
@@ -31565,7 +32486,7 @@
             </p:txBody>
           </p:sp>
         </mc:Choice>
-        <mc:Fallback xmlns="">
+        <mc:Fallback>
           <p:sp>
             <p:nvSpPr>
               <p:cNvPr id="4" name="Title 1">
@@ -31994,48 +32915,6 @@
       </mc:AlternateContent>
       <p:sp>
         <p:nvSpPr>
-          <p:cNvPr id="11" name="TextBox 10">
-            <a:extLst>
-              <a:ext uri="{FF2B5EF4-FFF2-40B4-BE49-F238E27FC236}">
-                <a16:creationId xmlns:a16="http://schemas.microsoft.com/office/drawing/2014/main" id="{89C2DFEE-FF9D-B34D-8DC1-4936733DA1DA}"/>
-              </a:ext>
-            </a:extLst>
-          </p:cNvPr>
-          <p:cNvSpPr txBox="1"/>
-          <p:nvPr/>
-        </p:nvSpPr>
-        <p:spPr>
-          <a:xfrm>
-            <a:off x="8541586" y="5348602"/>
-            <a:ext cx="3307413" cy="769441"/>
-          </a:xfrm>
-          <a:prstGeom prst="rect">
-            <a:avLst/>
-          </a:prstGeom>
-          <a:solidFill>
-            <a:schemeClr val="bg2">
-              <a:lumMod val="75000"/>
-            </a:schemeClr>
-          </a:solidFill>
-        </p:spPr>
-        <p:txBody>
-          <a:bodyPr wrap="square" rtlCol="0">
-            <a:spAutoFit/>
-          </a:bodyPr>
-          <a:lstStyle/>
-          <a:p>
-            <a:r>
-              <a:rPr lang="en-GB" sz="1100" dirty="0">
-                <a:latin typeface="Helvetica Neue Thin" panose="020B0403020202020204" pitchFamily="34" charset="0"/>
-                <a:ea typeface="Helvetica Neue Thin" panose="020B0403020202020204" pitchFamily="34" charset="0"/>
-              </a:rPr>
-              <a:t>Notes 1: There are a tonne of them, but you really don’t have to worry about any of them. You only need to concern yourself with how this link function works!</a:t>
-            </a:r>
-          </a:p>
-        </p:txBody>
-      </p:sp>
-      <p:sp>
-        <p:nvSpPr>
           <p:cNvPr id="2" name="Slide Number Placeholder 3">
             <a:extLst>
               <a:ext uri="{FF2B5EF4-FFF2-40B4-BE49-F238E27FC236}">
@@ -32307,7 +33186,7 @@
                 <a:ea typeface="Helvetica Neue Light" panose="02000403000000020004" pitchFamily="2" charset="0"/>
                 <a:cs typeface="Helvetica Neue" panose="02000503000000020004" pitchFamily="2" charset="0"/>
               </a:rPr>
-              <a:t>The linear regression model does not support any other outcome whose distribution is not from a Gaussian/Normal distribution. </a:t>
+              <a:t>By default, the linear regression model does not support any other outcome whose distribution is not from a Gaussian/Normal distribution. </a:t>
             </a:r>
           </a:p>
           <a:p>
@@ -32332,7 +33211,23 @@
                 <a:ea typeface="Helvetica Neue Light" panose="02000403000000020004" pitchFamily="2" charset="0"/>
                 <a:cs typeface="Helvetica Neue" panose="02000503000000020004" pitchFamily="2" charset="0"/>
               </a:rPr>
-              <a:t>However, by using some link function, allows the user to transform such outcome (i.e., that’s considered binary, polychotomous, discrete etc.,) that’s typical nonlinear</a:t>
+              <a:t>However, by using some </a:t>
+            </a:r>
+            <a:r>
+              <a:rPr lang="en-GB" sz="1800" b="1" dirty="0">
+                <a:latin typeface="Helvetica Neue Light" panose="02000403000000020004" pitchFamily="2" charset="0"/>
+                <a:ea typeface="Helvetica Neue Light" panose="02000403000000020004" pitchFamily="2" charset="0"/>
+                <a:cs typeface="Helvetica Neue" panose="02000503000000020004" pitchFamily="2" charset="0"/>
+              </a:rPr>
+              <a:t>link function</a:t>
+            </a:r>
+            <a:r>
+              <a:rPr lang="en-GB" sz="1800" dirty="0">
+                <a:latin typeface="Helvetica Neue Light" panose="02000403000000020004" pitchFamily="2" charset="0"/>
+                <a:ea typeface="Helvetica Neue Light" panose="02000403000000020004" pitchFamily="2" charset="0"/>
+                <a:cs typeface="Helvetica Neue" panose="02000503000000020004" pitchFamily="2" charset="0"/>
+              </a:rPr>
+              <a:t>, it allows the user to transform such outcome (i.e., that’s considered binary, polychotomous, discrete etc.,) in something that behave like a linear function</a:t>
             </a:r>
           </a:p>
           <a:p>
@@ -32401,7 +33296,7 @@
                 <a:ea typeface="Helvetica Neue Light" panose="02000403000000020004" pitchFamily="2" charset="0"/>
                 <a:cs typeface="Helvetica Neue" panose="02000503000000020004" pitchFamily="2" charset="0"/>
               </a:rPr>
-              <a:t>The type of link function implemented dependents on the type of analysis you are going to perform</a:t>
+              <a:t>The type of link function implemented on a model depends on the type of analysis you are going to perform</a:t>
             </a:r>
           </a:p>
           <a:p>
@@ -32724,8 +33619,8 @@
           </a:prstGeom>
         </p:spPr>
       </p:pic>
-      <mc:AlternateContent xmlns:mc="http://schemas.openxmlformats.org/markup-compatibility/2006" xmlns:a14="http://schemas.microsoft.com/office/drawing/2010/main">
-        <mc:Choice Requires="a14">
+      <mc:AlternateContent xmlns:mc="http://schemas.openxmlformats.org/markup-compatibility/2006">
+        <mc:Choice xmlns:a14="http://schemas.microsoft.com/office/drawing/2010/main" Requires="a14">
           <p:sp>
             <p:nvSpPr>
               <p:cNvPr id="8" name="TextBox 7">
@@ -32740,7 +33635,7 @@
             </p:nvSpPr>
             <p:spPr>
               <a:xfrm>
-                <a:off x="932122" y="4301068"/>
+                <a:off x="932122" y="4697675"/>
                 <a:ext cx="7293106" cy="523220"/>
               </a:xfrm>
               <a:prstGeom prst="rect">
@@ -32992,7 +33887,7 @@
             </p:txBody>
           </p:sp>
         </mc:Choice>
-        <mc:Fallback xmlns="">
+        <mc:Fallback>
           <p:sp>
             <p:nvSpPr>
               <p:cNvPr id="8" name="TextBox 7">
@@ -33009,7 +33904,7 @@
             </p:nvSpPr>
             <p:spPr>
               <a:xfrm>
-                <a:off x="932122" y="4301068"/>
+                <a:off x="932122" y="4697675"/>
                 <a:ext cx="7293106" cy="523220"/>
               </a:xfrm>
               <a:prstGeom prst="rect">

</xml_diff>

<commit_message>
Adding the Solutions for Week 1
</commit_message>
<xml_diff>
--- a/Lecture_notes_ppt/GEOG0125 Week 2 Lecture - Bayesian GLMs.pptx
+++ b/Lecture_notes_ppt/GEOG0125 Week 2 Lecture - Bayesian GLMs.pptx
@@ -248,7 +248,7 @@
           <a:p>
             <a:fld id="{B189E245-271D-FD48-BFBB-D05CACE4EE11}" type="datetimeFigureOut">
               <a:rPr lang="en-US" smtClean="0"/>
-              <a:t>1/22/25</a:t>
+              <a:t>1/24/25</a:t>
             </a:fld>
             <a:endParaRPr lang="en-US"/>
           </a:p>
@@ -1931,7 +1931,7 @@
           <a:p>
             <a:fld id="{2BB000D9-F882-5444-9F67-E68F2BDFFFE1}" type="datetimeFigureOut">
               <a:rPr lang="en-US" smtClean="0"/>
-              <a:t>1/22/25</a:t>
+              <a:t>1/24/25</a:t>
             </a:fld>
             <a:endParaRPr lang="en-US"/>
           </a:p>
@@ -2139,7 +2139,7 @@
           <a:p>
             <a:fld id="{2BB000D9-F882-5444-9F67-E68F2BDFFFE1}" type="datetimeFigureOut">
               <a:rPr lang="en-US" smtClean="0"/>
-              <a:t>1/22/25</a:t>
+              <a:t>1/24/25</a:t>
             </a:fld>
             <a:endParaRPr lang="en-US"/>
           </a:p>
@@ -2557,7 +2557,7 @@
           <a:p>
             <a:fld id="{C21145F5-A5E9-5F43-82CD-3B9BA6E3131E}" type="datetimeFigureOut">
               <a:rPr lang="en-US" smtClean="0"/>
-              <a:t>1/22/25</a:t>
+              <a:t>1/24/25</a:t>
             </a:fld>
             <a:endParaRPr lang="en-US"/>
           </a:p>
@@ -2765,7 +2765,7 @@
           <a:p>
             <a:fld id="{C21145F5-A5E9-5F43-82CD-3B9BA6E3131E}" type="datetimeFigureOut">
               <a:rPr lang="en-US" smtClean="0"/>
-              <a:t>1/22/25</a:t>
+              <a:t>1/24/25</a:t>
             </a:fld>
             <a:endParaRPr lang="en-US"/>
           </a:p>
@@ -3040,7 +3040,7 @@
           <a:p>
             <a:fld id="{C21145F5-A5E9-5F43-82CD-3B9BA6E3131E}" type="datetimeFigureOut">
               <a:rPr lang="en-US" smtClean="0"/>
-              <a:t>1/22/25</a:t>
+              <a:t>1/24/25</a:t>
             </a:fld>
             <a:endParaRPr lang="en-US"/>
           </a:p>
@@ -3307,7 +3307,7 @@
           <a:p>
             <a:fld id="{C21145F5-A5E9-5F43-82CD-3B9BA6E3131E}" type="datetimeFigureOut">
               <a:rPr lang="en-US" smtClean="0"/>
-              <a:t>1/22/25</a:t>
+              <a:t>1/24/25</a:t>
             </a:fld>
             <a:endParaRPr lang="en-US"/>
           </a:p>
@@ -3710,7 +3710,7 @@
           <a:p>
             <a:fld id="{C21145F5-A5E9-5F43-82CD-3B9BA6E3131E}" type="datetimeFigureOut">
               <a:rPr lang="en-US" smtClean="0"/>
-              <a:t>1/22/25</a:t>
+              <a:t>1/24/25</a:t>
             </a:fld>
             <a:endParaRPr lang="en-US"/>
           </a:p>
@@ -3889,7 +3889,7 @@
           <a:p>
             <a:fld id="{C21145F5-A5E9-5F43-82CD-3B9BA6E3131E}" type="datetimeFigureOut">
               <a:rPr lang="en-US" smtClean="0"/>
-              <a:t>1/22/25</a:t>
+              <a:t>1/24/25</a:t>
             </a:fld>
             <a:endParaRPr lang="en-US"/>
           </a:p>
@@ -4008,7 +4008,7 @@
           <a:p>
             <a:fld id="{C21145F5-A5E9-5F43-82CD-3B9BA6E3131E}" type="datetimeFigureOut">
               <a:rPr lang="en-US" smtClean="0"/>
-              <a:t>1/22/25</a:t>
+              <a:t>1/24/25</a:t>
             </a:fld>
             <a:endParaRPr lang="en-US"/>
           </a:p>
@@ -4316,7 +4316,7 @@
           <a:p>
             <a:fld id="{C21145F5-A5E9-5F43-82CD-3B9BA6E3131E}" type="datetimeFigureOut">
               <a:rPr lang="en-US" smtClean="0"/>
-              <a:t>1/22/25</a:t>
+              <a:t>1/24/25</a:t>
             </a:fld>
             <a:endParaRPr lang="en-US"/>
           </a:p>
@@ -4601,7 +4601,7 @@
           <a:p>
             <a:fld id="{C21145F5-A5E9-5F43-82CD-3B9BA6E3131E}" type="datetimeFigureOut">
               <a:rPr lang="en-US" smtClean="0"/>
-              <a:t>1/22/25</a:t>
+              <a:t>1/24/25</a:t>
             </a:fld>
             <a:endParaRPr lang="en-US"/>
           </a:p>
@@ -4809,7 +4809,7 @@
           <a:p>
             <a:fld id="{C21145F5-A5E9-5F43-82CD-3B9BA6E3131E}" type="datetimeFigureOut">
               <a:rPr lang="en-US" smtClean="0"/>
-              <a:t>1/22/25</a:t>
+              <a:t>1/24/25</a:t>
             </a:fld>
             <a:endParaRPr lang="en-US"/>
           </a:p>
@@ -5017,7 +5017,7 @@
           <a:p>
             <a:fld id="{C21145F5-A5E9-5F43-82CD-3B9BA6E3131E}" type="datetimeFigureOut">
               <a:rPr lang="en-US" smtClean="0"/>
-              <a:t>1/22/25</a:t>
+              <a:t>1/24/25</a:t>
             </a:fld>
             <a:endParaRPr lang="en-US"/>
           </a:p>
@@ -5325,7 +5325,7 @@
           <a:p>
             <a:fld id="{2BB000D9-F882-5444-9F67-E68F2BDFFFE1}" type="datetimeFigureOut">
               <a:rPr lang="en-US" smtClean="0"/>
-              <a:t>1/22/25</a:t>
+              <a:t>1/24/25</a:t>
             </a:fld>
             <a:endParaRPr lang="en-US"/>
           </a:p>
@@ -5592,7 +5592,7 @@
           <a:p>
             <a:fld id="{2BB000D9-F882-5444-9F67-E68F2BDFFFE1}" type="datetimeFigureOut">
               <a:rPr lang="en-US" smtClean="0"/>
-              <a:t>1/22/25</a:t>
+              <a:t>1/24/25</a:t>
             </a:fld>
             <a:endParaRPr lang="en-US"/>
           </a:p>
@@ -5995,7 +5995,7 @@
           <a:p>
             <a:fld id="{2BB000D9-F882-5444-9F67-E68F2BDFFFE1}" type="datetimeFigureOut">
               <a:rPr lang="en-US" smtClean="0"/>
-              <a:t>1/22/25</a:t>
+              <a:t>1/24/25</a:t>
             </a:fld>
             <a:endParaRPr lang="en-US"/>
           </a:p>
@@ -6144,7 +6144,7 @@
           <a:p>
             <a:fld id="{2BB000D9-F882-5444-9F67-E68F2BDFFFE1}" type="datetimeFigureOut">
               <a:rPr lang="en-US" smtClean="0"/>
-              <a:t>1/22/25</a:t>
+              <a:t>1/24/25</a:t>
             </a:fld>
             <a:endParaRPr lang="en-US"/>
           </a:p>
@@ -6263,7 +6263,7 @@
           <a:p>
             <a:fld id="{2BB000D9-F882-5444-9F67-E68F2BDFFFE1}" type="datetimeFigureOut">
               <a:rPr lang="en-US" smtClean="0"/>
-              <a:t>1/22/25</a:t>
+              <a:t>1/24/25</a:t>
             </a:fld>
             <a:endParaRPr lang="en-US"/>
           </a:p>
@@ -6571,7 +6571,7 @@
           <a:p>
             <a:fld id="{2BB000D9-F882-5444-9F67-E68F2BDFFFE1}" type="datetimeFigureOut">
               <a:rPr lang="en-US" smtClean="0"/>
-              <a:t>1/22/25</a:t>
+              <a:t>1/24/25</a:t>
             </a:fld>
             <a:endParaRPr lang="en-US"/>
           </a:p>
@@ -6856,7 +6856,7 @@
           <a:p>
             <a:fld id="{2BB000D9-F882-5444-9F67-E68F2BDFFFE1}" type="datetimeFigureOut">
               <a:rPr lang="en-US" smtClean="0"/>
-              <a:t>1/22/25</a:t>
+              <a:t>1/24/25</a:t>
             </a:fld>
             <a:endParaRPr lang="en-US"/>
           </a:p>
@@ -8552,29 +8552,7 @@
                 <a:ea typeface="Helvetica Neue Light" panose="02000403000000020004" pitchFamily="2" charset="0"/>
                 <a:cs typeface="Calibri Light" charset="0"/>
               </a:rPr>
-              <a:t> linear </a:t>
-            </a:r>
-            <a:r>
-              <a:rPr lang="en-GB" sz="3200" b="1" cap="all" dirty="0" err="1">
-                <a:solidFill>
-                  <a:prstClr val="black"/>
-                </a:solidFill>
-                <a:latin typeface="Helvetica Neue Light" panose="02000403000000020004" pitchFamily="2" charset="0"/>
-                <a:ea typeface="Helvetica Neue Light" panose="02000403000000020004" pitchFamily="2" charset="0"/>
-                <a:cs typeface="Calibri Light" charset="0"/>
-              </a:rPr>
-              <a:t>modelS</a:t>
-            </a:r>
-            <a:r>
-              <a:rPr lang="en-GB" sz="3200" b="1" cap="all" dirty="0">
-                <a:solidFill>
-                  <a:prstClr val="black"/>
-                </a:solidFill>
-                <a:latin typeface="Helvetica Neue Light" panose="02000403000000020004" pitchFamily="2" charset="0"/>
-                <a:ea typeface="Helvetica Neue Light" panose="02000403000000020004" pitchFamily="2" charset="0"/>
-                <a:cs typeface="Calibri Light" charset="0"/>
-              </a:rPr>
-              <a:t> (GLM)</a:t>
+              <a:t> linear models (GLM)</a:t>
             </a:r>
           </a:p>
           <a:p>
@@ -8721,14 +8699,14 @@
           </a:prstGeom>
           <a:extLst>
             <a:ext uri="{909E8E84-426E-40dd-AFC4-6F175D3DCCD1}">
-              <a14:hiddenFill xmlns="" xmlns:a14="http://schemas.microsoft.com/office/drawing/2010/main">
+              <a14:hiddenFill xmlns:a14="http://schemas.microsoft.com/office/drawing/2010/main" xmlns="">
                 <a:solidFill>
                   <a:srgbClr val="FFFFFF"/>
                 </a:solidFill>
               </a14:hiddenFill>
             </a:ext>
             <a:ext uri="{91240B29-F687-4f45-9708-019B960494DF}">
-              <a14:hiddenLine xmlns="" xmlns:a14="http://schemas.microsoft.com/office/drawing/2010/main" w="9525">
+              <a14:hiddenLine xmlns:a14="http://schemas.microsoft.com/office/drawing/2010/main" xmlns="" w="9525">
                 <a:solidFill>
                   <a:srgbClr val="000000"/>
                 </a:solidFill>
@@ -10280,14 +10258,14 @@
           </a:prstGeom>
           <a:extLst>
             <a:ext uri="{909E8E84-426E-40dd-AFC4-6F175D3DCCD1}">
-              <a14:hiddenFill xmlns="" xmlns:a14="http://schemas.microsoft.com/office/drawing/2010/main">
+              <a14:hiddenFill xmlns:a14="http://schemas.microsoft.com/office/drawing/2010/main" xmlns="">
                 <a:solidFill>
                   <a:srgbClr val="FFFFFF"/>
                 </a:solidFill>
               </a14:hiddenFill>
             </a:ext>
             <a:ext uri="{91240B29-F687-4f45-9708-019B960494DF}">
-              <a14:hiddenLine xmlns="" xmlns:a14="http://schemas.microsoft.com/office/drawing/2010/main" w="9525">
+              <a14:hiddenLine xmlns:a14="http://schemas.microsoft.com/office/drawing/2010/main" xmlns="" w="9525">
                 <a:solidFill>
                   <a:srgbClr val="000000"/>
                 </a:solidFill>
@@ -11312,14 +11290,14 @@
           </a:prstGeom>
           <a:extLst>
             <a:ext uri="{909E8E84-426E-40dd-AFC4-6F175D3DCCD1}">
-              <a14:hiddenFill xmlns="" xmlns:a14="http://schemas.microsoft.com/office/drawing/2010/main">
+              <a14:hiddenFill xmlns:a14="http://schemas.microsoft.com/office/drawing/2010/main" xmlns="">
                 <a:solidFill>
                   <a:srgbClr val="FFFFFF"/>
                 </a:solidFill>
               </a14:hiddenFill>
             </a:ext>
             <a:ext uri="{91240B29-F687-4f45-9708-019B960494DF}">
-              <a14:hiddenLine xmlns="" xmlns:a14="http://schemas.microsoft.com/office/drawing/2010/main" w="9525">
+              <a14:hiddenLine xmlns:a14="http://schemas.microsoft.com/office/drawing/2010/main" xmlns="" w="9525">
                 <a:solidFill>
                   <a:srgbClr val="000000"/>
                 </a:solidFill>
@@ -12105,8 +12083,8 @@
           </p:sp>
         </mc:Fallback>
       </mc:AlternateContent>
-      <mc:AlternateContent xmlns:mc="http://schemas.openxmlformats.org/markup-compatibility/2006">
-        <mc:Choice xmlns:a14="http://schemas.microsoft.com/office/drawing/2010/main" Requires="a14">
+      <mc:AlternateContent xmlns:mc="http://schemas.openxmlformats.org/markup-compatibility/2006" xmlns:a14="http://schemas.microsoft.com/office/drawing/2010/main">
+        <mc:Choice Requires="a14">
           <p:sp>
             <p:nvSpPr>
               <p:cNvPr id="2" name="TextBox 1">
@@ -12311,7 +12289,7 @@
             </p:txBody>
           </p:sp>
         </mc:Choice>
-        <mc:Fallback>
+        <mc:Fallback xmlns="">
           <p:sp>
             <p:nvSpPr>
               <p:cNvPr id="2" name="TextBox 1">
@@ -12443,14 +12421,14 @@
           </a:prstGeom>
           <a:extLst>
             <a:ext uri="{909E8E84-426E-40dd-AFC4-6F175D3DCCD1}">
-              <a14:hiddenFill xmlns="" xmlns:a14="http://schemas.microsoft.com/office/drawing/2010/main">
+              <a14:hiddenFill xmlns:a14="http://schemas.microsoft.com/office/drawing/2010/main" xmlns="">
                 <a:solidFill>
                   <a:srgbClr val="FFFFFF"/>
                 </a:solidFill>
               </a14:hiddenFill>
             </a:ext>
             <a:ext uri="{91240B29-F687-4f45-9708-019B960494DF}">
-              <a14:hiddenLine xmlns="" xmlns:a14="http://schemas.microsoft.com/office/drawing/2010/main" w="9525">
+              <a14:hiddenLine xmlns:a14="http://schemas.microsoft.com/office/drawing/2010/main" xmlns="" w="9525">
                 <a:solidFill>
                   <a:srgbClr val="000000"/>
                 </a:solidFill>
@@ -12871,14 +12849,14 @@
           </a:prstGeom>
           <a:extLst>
             <a:ext uri="{909E8E84-426E-40dd-AFC4-6F175D3DCCD1}">
-              <a14:hiddenFill xmlns="" xmlns:a14="http://schemas.microsoft.com/office/drawing/2010/main">
+              <a14:hiddenFill xmlns:a14="http://schemas.microsoft.com/office/drawing/2010/main" xmlns="">
                 <a:solidFill>
                   <a:srgbClr val="FFFFFF"/>
                 </a:solidFill>
               </a14:hiddenFill>
             </a:ext>
             <a:ext uri="{91240B29-F687-4f45-9708-019B960494DF}">
-              <a14:hiddenLine xmlns="" xmlns:a14="http://schemas.microsoft.com/office/drawing/2010/main" w="9525">
+              <a14:hiddenLine xmlns:a14="http://schemas.microsoft.com/office/drawing/2010/main" xmlns="" w="9525">
                 <a:solidFill>
                   <a:srgbClr val="000000"/>
                 </a:solidFill>
@@ -13228,14 +13206,14 @@
           </a:prstGeom>
           <a:extLst>
             <a:ext uri="{909E8E84-426E-40dd-AFC4-6F175D3DCCD1}">
-              <a14:hiddenFill xmlns="" xmlns:a14="http://schemas.microsoft.com/office/drawing/2010/main">
+              <a14:hiddenFill xmlns:a14="http://schemas.microsoft.com/office/drawing/2010/main" xmlns="">
                 <a:solidFill>
                   <a:srgbClr val="FFFFFF"/>
                 </a:solidFill>
               </a14:hiddenFill>
             </a:ext>
             <a:ext uri="{91240B29-F687-4f45-9708-019B960494DF}">
-              <a14:hiddenLine xmlns="" xmlns:a14="http://schemas.microsoft.com/office/drawing/2010/main" w="9525">
+              <a14:hiddenLine xmlns:a14="http://schemas.microsoft.com/office/drawing/2010/main" xmlns="" w="9525">
                 <a:solidFill>
                   <a:srgbClr val="000000"/>
                 </a:solidFill>
@@ -14450,14 +14428,14 @@
           </a:prstGeom>
           <a:extLst>
             <a:ext uri="{909E8E84-426E-40dd-AFC4-6F175D3DCCD1}">
-              <a14:hiddenFill xmlns="" xmlns:a14="http://schemas.microsoft.com/office/drawing/2010/main">
+              <a14:hiddenFill xmlns:a14="http://schemas.microsoft.com/office/drawing/2010/main" xmlns="">
                 <a:solidFill>
                   <a:srgbClr val="FFFFFF"/>
                 </a:solidFill>
               </a14:hiddenFill>
             </a:ext>
             <a:ext uri="{91240B29-F687-4f45-9708-019B960494DF}">
-              <a14:hiddenLine xmlns="" xmlns:a14="http://schemas.microsoft.com/office/drawing/2010/main" w="9525">
+              <a14:hiddenLine xmlns:a14="http://schemas.microsoft.com/office/drawing/2010/main" xmlns="" w="9525">
                 <a:solidFill>
                   <a:srgbClr val="000000"/>
                 </a:solidFill>
@@ -14726,8 +14704,8 @@
           </a:prstGeom>
         </p:spPr>
       </p:pic>
-      <mc:AlternateContent xmlns:mc="http://schemas.openxmlformats.org/markup-compatibility/2006">
-        <mc:Choice xmlns:a14="http://schemas.microsoft.com/office/drawing/2010/main" Requires="a14">
+      <mc:AlternateContent xmlns:mc="http://schemas.openxmlformats.org/markup-compatibility/2006" xmlns:a14="http://schemas.microsoft.com/office/drawing/2010/main">
+        <mc:Choice Requires="a14">
           <p:sp>
             <p:nvSpPr>
               <p:cNvPr id="2" name="TextBox 1">
@@ -14918,7 +14896,7 @@
             </p:txBody>
           </p:sp>
         </mc:Choice>
-        <mc:Fallback>
+        <mc:Fallback xmlns="">
           <p:sp>
             <p:nvSpPr>
               <p:cNvPr id="2" name="TextBox 1">
@@ -15511,14 +15489,14 @@
           </a:prstGeom>
           <a:extLst>
             <a:ext uri="{909E8E84-426E-40dd-AFC4-6F175D3DCCD1}">
-              <a14:hiddenFill xmlns="" xmlns:a14="http://schemas.microsoft.com/office/drawing/2010/main">
+              <a14:hiddenFill xmlns:a14="http://schemas.microsoft.com/office/drawing/2010/main" xmlns="">
                 <a:solidFill>
                   <a:srgbClr val="FFFFFF"/>
                 </a:solidFill>
               </a14:hiddenFill>
             </a:ext>
             <a:ext uri="{91240B29-F687-4f45-9708-019B960494DF}">
-              <a14:hiddenLine xmlns="" xmlns:a14="http://schemas.microsoft.com/office/drawing/2010/main" w="9525">
+              <a14:hiddenLine xmlns:a14="http://schemas.microsoft.com/office/drawing/2010/main" xmlns="" w="9525">
                 <a:solidFill>
                   <a:srgbClr val="000000"/>
                 </a:solidFill>
@@ -15939,14 +15917,14 @@
           </a:prstGeom>
           <a:extLst>
             <a:ext uri="{909E8E84-426E-40dd-AFC4-6F175D3DCCD1}">
-              <a14:hiddenFill xmlns="" xmlns:a14="http://schemas.microsoft.com/office/drawing/2010/main">
+              <a14:hiddenFill xmlns:a14="http://schemas.microsoft.com/office/drawing/2010/main" xmlns="">
                 <a:solidFill>
                   <a:srgbClr val="FFFFFF"/>
                 </a:solidFill>
               </a14:hiddenFill>
             </a:ext>
             <a:ext uri="{91240B29-F687-4f45-9708-019B960494DF}">
-              <a14:hiddenLine xmlns="" xmlns:a14="http://schemas.microsoft.com/office/drawing/2010/main" w="9525">
+              <a14:hiddenLine xmlns:a14="http://schemas.microsoft.com/office/drawing/2010/main" xmlns="" w="9525">
                 <a:solidFill>
                   <a:srgbClr val="000000"/>
                 </a:solidFill>
@@ -16419,14 +16397,14 @@
           </a:prstGeom>
           <a:extLst>
             <a:ext uri="{909E8E84-426E-40dd-AFC4-6F175D3DCCD1}">
-              <a14:hiddenFill xmlns="" xmlns:a14="http://schemas.microsoft.com/office/drawing/2010/main">
+              <a14:hiddenFill xmlns:a14="http://schemas.microsoft.com/office/drawing/2010/main" xmlns="">
                 <a:solidFill>
                   <a:srgbClr val="FFFFFF"/>
                 </a:solidFill>
               </a14:hiddenFill>
             </a:ext>
             <a:ext uri="{91240B29-F687-4f45-9708-019B960494DF}">
-              <a14:hiddenLine xmlns="" xmlns:a14="http://schemas.microsoft.com/office/drawing/2010/main" w="9525">
+              <a14:hiddenLine xmlns:a14="http://schemas.microsoft.com/office/drawing/2010/main" xmlns="" w="9525">
                 <a:solidFill>
                   <a:srgbClr val="000000"/>
                 </a:solidFill>
@@ -17028,14 +17006,14 @@
           </a:prstGeom>
           <a:extLst>
             <a:ext uri="{909E8E84-426E-40dd-AFC4-6F175D3DCCD1}">
-              <a14:hiddenFill xmlns="" xmlns:a14="http://schemas.microsoft.com/office/drawing/2010/main">
+              <a14:hiddenFill xmlns:a14="http://schemas.microsoft.com/office/drawing/2010/main" xmlns="">
                 <a:solidFill>
                   <a:srgbClr val="FFFFFF"/>
                 </a:solidFill>
               </a14:hiddenFill>
             </a:ext>
             <a:ext uri="{91240B29-F687-4f45-9708-019B960494DF}">
-              <a14:hiddenLine xmlns="" xmlns:a14="http://schemas.microsoft.com/office/drawing/2010/main" w="9525">
+              <a14:hiddenLine xmlns:a14="http://schemas.microsoft.com/office/drawing/2010/main" xmlns="" w="9525">
                 <a:solidFill>
                   <a:srgbClr val="000000"/>
                 </a:solidFill>
@@ -19454,14 +19432,14 @@
           </a:prstGeom>
           <a:extLst>
             <a:ext uri="{909E8E84-426E-40dd-AFC4-6F175D3DCCD1}">
-              <a14:hiddenFill xmlns="" xmlns:a14="http://schemas.microsoft.com/office/drawing/2010/main">
+              <a14:hiddenFill xmlns:a14="http://schemas.microsoft.com/office/drawing/2010/main" xmlns="">
                 <a:solidFill>
                   <a:srgbClr val="FFFFFF"/>
                 </a:solidFill>
               </a14:hiddenFill>
             </a:ext>
             <a:ext uri="{91240B29-F687-4f45-9708-019B960494DF}">
-              <a14:hiddenLine xmlns="" xmlns:a14="http://schemas.microsoft.com/office/drawing/2010/main" w="9525">
+              <a14:hiddenLine xmlns:a14="http://schemas.microsoft.com/office/drawing/2010/main" xmlns="" w="9525">
                 <a:solidFill>
                   <a:srgbClr val="000000"/>
                 </a:solidFill>
@@ -19770,14 +19748,14 @@
           </a:prstGeom>
           <a:extLst>
             <a:ext uri="{909E8E84-426E-40dd-AFC4-6F175D3DCCD1}">
-              <a14:hiddenFill xmlns="" xmlns:a14="http://schemas.microsoft.com/office/drawing/2010/main">
+              <a14:hiddenFill xmlns:a14="http://schemas.microsoft.com/office/drawing/2010/main" xmlns="">
                 <a:solidFill>
                   <a:srgbClr val="FFFFFF"/>
                 </a:solidFill>
               </a14:hiddenFill>
             </a:ext>
             <a:ext uri="{91240B29-F687-4f45-9708-019B960494DF}">
-              <a14:hiddenLine xmlns="" xmlns:a14="http://schemas.microsoft.com/office/drawing/2010/main" w="9525">
+              <a14:hiddenLine xmlns:a14="http://schemas.microsoft.com/office/drawing/2010/main" xmlns="" w="9525">
                 <a:solidFill>
                   <a:srgbClr val="000000"/>
                 </a:solidFill>
@@ -20239,14 +20217,14 @@
           </a:prstGeom>
           <a:extLst>
             <a:ext uri="{909E8E84-426E-40dd-AFC4-6F175D3DCCD1}">
-              <a14:hiddenFill xmlns="" xmlns:a14="http://schemas.microsoft.com/office/drawing/2010/main">
+              <a14:hiddenFill xmlns:a14="http://schemas.microsoft.com/office/drawing/2010/main" xmlns="">
                 <a:solidFill>
                   <a:srgbClr val="FFFFFF"/>
                 </a:solidFill>
               </a14:hiddenFill>
             </a:ext>
             <a:ext uri="{91240B29-F687-4f45-9708-019B960494DF}">
-              <a14:hiddenLine xmlns="" xmlns:a14="http://schemas.microsoft.com/office/drawing/2010/main" w="9525">
+              <a14:hiddenLine xmlns:a14="http://schemas.microsoft.com/office/drawing/2010/main" xmlns="" w="9525">
                 <a:solidFill>
                   <a:srgbClr val="000000"/>
                 </a:solidFill>
@@ -23085,14 +23063,14 @@
           </a:prstGeom>
           <a:extLst>
             <a:ext uri="{909E8E84-426E-40dd-AFC4-6F175D3DCCD1}">
-              <a14:hiddenFill xmlns="" xmlns:a14="http://schemas.microsoft.com/office/drawing/2010/main">
+              <a14:hiddenFill xmlns:a14="http://schemas.microsoft.com/office/drawing/2010/main" xmlns="">
                 <a:solidFill>
                   <a:srgbClr val="FFFFFF"/>
                 </a:solidFill>
               </a14:hiddenFill>
             </a:ext>
             <a:ext uri="{91240B29-F687-4f45-9708-019B960494DF}">
-              <a14:hiddenLine xmlns="" xmlns:a14="http://schemas.microsoft.com/office/drawing/2010/main" w="9525">
+              <a14:hiddenLine xmlns:a14="http://schemas.microsoft.com/office/drawing/2010/main" xmlns="" w="9525">
                 <a:solidFill>
                   <a:srgbClr val="000000"/>
                 </a:solidFill>
@@ -23305,8 +23283,8 @@
           <a:chExt cx="0" cy="0"/>
         </a:xfrm>
       </p:grpSpPr>
-      <mc:AlternateContent xmlns:mc="http://schemas.openxmlformats.org/markup-compatibility/2006">
-        <mc:Choice xmlns:a14="http://schemas.microsoft.com/office/drawing/2010/main" Requires="a14">
+      <mc:AlternateContent xmlns:mc="http://schemas.openxmlformats.org/markup-compatibility/2006" xmlns:a14="http://schemas.microsoft.com/office/drawing/2010/main">
+        <mc:Choice Requires="a14">
           <p:sp>
             <p:nvSpPr>
               <p:cNvPr id="2" name="TextBox 1">
@@ -23667,7 +23645,7 @@
             </p:txBody>
           </p:sp>
         </mc:Choice>
-        <mc:Fallback>
+        <mc:Fallback xmlns="">
           <p:sp>
             <p:nvSpPr>
               <p:cNvPr id="2" name="TextBox 1">
@@ -25528,8 +25506,8 @@
           </a:fontRef>
         </p:style>
       </p:cxnSp>
-      <mc:AlternateContent xmlns:mc="http://schemas.openxmlformats.org/markup-compatibility/2006">
-        <mc:Choice xmlns:a14="http://schemas.microsoft.com/office/drawing/2010/main" Requires="a14">
+      <mc:AlternateContent xmlns:mc="http://schemas.openxmlformats.org/markup-compatibility/2006" xmlns:a14="http://schemas.microsoft.com/office/drawing/2010/main">
+        <mc:Choice Requires="a14">
           <p:sp>
             <p:nvSpPr>
               <p:cNvPr id="36" name="TextBox 35">
@@ -25627,7 +25605,7 @@
             </p:txBody>
           </p:sp>
         </mc:Choice>
-        <mc:Fallback>
+        <mc:Fallback xmlns="">
           <p:sp>
             <p:nvSpPr>
               <p:cNvPr id="36" name="TextBox 35">
@@ -26128,14 +26106,14 @@
           </a:prstGeom>
           <a:extLst>
             <a:ext uri="{909E8E84-426E-40dd-AFC4-6F175D3DCCD1}">
-              <a14:hiddenFill xmlns="" xmlns:a14="http://schemas.microsoft.com/office/drawing/2010/main">
+              <a14:hiddenFill xmlns:a14="http://schemas.microsoft.com/office/drawing/2010/main" xmlns="">
                 <a:solidFill>
                   <a:srgbClr val="FFFFFF"/>
                 </a:solidFill>
               </a14:hiddenFill>
             </a:ext>
             <a:ext uri="{91240B29-F687-4f45-9708-019B960494DF}">
-              <a14:hiddenLine xmlns="" xmlns:a14="http://schemas.microsoft.com/office/drawing/2010/main" w="9525">
+              <a14:hiddenLine xmlns:a14="http://schemas.microsoft.com/office/drawing/2010/main" xmlns="" w="9525">
                 <a:solidFill>
                   <a:srgbClr val="000000"/>
                 </a:solidFill>
@@ -27111,14 +27089,14 @@
           </a:prstGeom>
           <a:extLst>
             <a:ext uri="{909E8E84-426E-40dd-AFC4-6F175D3DCCD1}">
-              <a14:hiddenFill xmlns="" xmlns:a14="http://schemas.microsoft.com/office/drawing/2010/main">
+              <a14:hiddenFill xmlns:a14="http://schemas.microsoft.com/office/drawing/2010/main" xmlns="">
                 <a:solidFill>
                   <a:srgbClr val="FFFFFF"/>
                 </a:solidFill>
               </a14:hiddenFill>
             </a:ext>
             <a:ext uri="{91240B29-F687-4f45-9708-019B960494DF}">
-              <a14:hiddenLine xmlns="" xmlns:a14="http://schemas.microsoft.com/office/drawing/2010/main" w="9525">
+              <a14:hiddenLine xmlns:a14="http://schemas.microsoft.com/office/drawing/2010/main" xmlns="" w="9525">
                 <a:solidFill>
                   <a:srgbClr val="000000"/>
                 </a:solidFill>
@@ -27643,14 +27621,14 @@
           </a:prstGeom>
           <a:extLst>
             <a:ext uri="{909E8E84-426E-40dd-AFC4-6F175D3DCCD1}">
-              <a14:hiddenFill xmlns="" xmlns:a14="http://schemas.microsoft.com/office/drawing/2010/main">
+              <a14:hiddenFill xmlns:a14="http://schemas.microsoft.com/office/drawing/2010/main" xmlns="">
                 <a:solidFill>
                   <a:srgbClr val="FFFFFF"/>
                 </a:solidFill>
               </a14:hiddenFill>
             </a:ext>
             <a:ext uri="{91240B29-F687-4f45-9708-019B960494DF}">
-              <a14:hiddenLine xmlns="" xmlns:a14="http://schemas.microsoft.com/office/drawing/2010/main" w="9525">
+              <a14:hiddenLine xmlns:a14="http://schemas.microsoft.com/office/drawing/2010/main" xmlns="" w="9525">
                 <a:solidFill>
                   <a:srgbClr val="000000"/>
                 </a:solidFill>
@@ -28042,14 +28020,14 @@
           </a:prstGeom>
           <a:extLst>
             <a:ext uri="{909E8E84-426E-40dd-AFC4-6F175D3DCCD1}">
-              <a14:hiddenFill xmlns="" xmlns:a14="http://schemas.microsoft.com/office/drawing/2010/main">
+              <a14:hiddenFill xmlns:a14="http://schemas.microsoft.com/office/drawing/2010/main" xmlns="">
                 <a:solidFill>
                   <a:srgbClr val="FFFFFF"/>
                 </a:solidFill>
               </a14:hiddenFill>
             </a:ext>
             <a:ext uri="{91240B29-F687-4f45-9708-019B960494DF}">
-              <a14:hiddenLine xmlns="" xmlns:a14="http://schemas.microsoft.com/office/drawing/2010/main" w="9525">
+              <a14:hiddenLine xmlns:a14="http://schemas.microsoft.com/office/drawing/2010/main" xmlns="" w="9525">
                 <a:solidFill>
                   <a:srgbClr val="000000"/>
                 </a:solidFill>
@@ -29230,14 +29208,14 @@
           </a:prstGeom>
           <a:extLst>
             <a:ext uri="{909E8E84-426E-40dd-AFC4-6F175D3DCCD1}">
-              <a14:hiddenFill xmlns="" xmlns:a14="http://schemas.microsoft.com/office/drawing/2010/main">
+              <a14:hiddenFill xmlns:a14="http://schemas.microsoft.com/office/drawing/2010/main" xmlns="">
                 <a:solidFill>
                   <a:srgbClr val="FFFFFF"/>
                 </a:solidFill>
               </a14:hiddenFill>
             </a:ext>
             <a:ext uri="{91240B29-F687-4f45-9708-019B960494DF}">
-              <a14:hiddenLine xmlns="" xmlns:a14="http://schemas.microsoft.com/office/drawing/2010/main" w="9525">
+              <a14:hiddenLine xmlns:a14="http://schemas.microsoft.com/office/drawing/2010/main" xmlns="" w="9525">
                 <a:solidFill>
                   <a:srgbClr val="000000"/>
                 </a:solidFill>
@@ -30376,14 +30354,14 @@
           </a:prstGeom>
           <a:extLst>
             <a:ext uri="{909E8E84-426E-40dd-AFC4-6F175D3DCCD1}">
-              <a14:hiddenFill xmlns="" xmlns:a14="http://schemas.microsoft.com/office/drawing/2010/main">
+              <a14:hiddenFill xmlns:a14="http://schemas.microsoft.com/office/drawing/2010/main" xmlns="">
                 <a:solidFill>
                   <a:srgbClr val="FFFFFF"/>
                 </a:solidFill>
               </a14:hiddenFill>
             </a:ext>
             <a:ext uri="{91240B29-F687-4f45-9708-019B960494DF}">
-              <a14:hiddenLine xmlns="" xmlns:a14="http://schemas.microsoft.com/office/drawing/2010/main" w="9525">
+              <a14:hiddenLine xmlns:a14="http://schemas.microsoft.com/office/drawing/2010/main" xmlns="" w="9525">
                 <a:solidFill>
                   <a:srgbClr val="000000"/>
                 </a:solidFill>
@@ -31563,14 +31541,14 @@
           </a:prstGeom>
           <a:extLst>
             <a:ext uri="{909E8E84-426E-40dd-AFC4-6F175D3DCCD1}">
-              <a14:hiddenFill xmlns="" xmlns:a14="http://schemas.microsoft.com/office/drawing/2010/main">
+              <a14:hiddenFill xmlns:a14="http://schemas.microsoft.com/office/drawing/2010/main" xmlns="">
                 <a:solidFill>
                   <a:srgbClr val="FFFFFF"/>
                 </a:solidFill>
               </a14:hiddenFill>
             </a:ext>
             <a:ext uri="{91240B29-F687-4f45-9708-019B960494DF}">
-              <a14:hiddenLine xmlns="" xmlns:a14="http://schemas.microsoft.com/office/drawing/2010/main" w="9525">
+              <a14:hiddenLine xmlns:a14="http://schemas.microsoft.com/office/drawing/2010/main" xmlns="" w="9525">
                 <a:solidFill>
                   <a:srgbClr val="000000"/>
                 </a:solidFill>
@@ -31893,14 +31871,14 @@
           </a:prstGeom>
           <a:extLst>
             <a:ext uri="{909E8E84-426E-40dd-AFC4-6F175D3DCCD1}">
-              <a14:hiddenFill xmlns="" xmlns:a14="http://schemas.microsoft.com/office/drawing/2010/main">
+              <a14:hiddenFill xmlns:a14="http://schemas.microsoft.com/office/drawing/2010/main" xmlns="">
                 <a:solidFill>
                   <a:srgbClr val="FFFFFF"/>
                 </a:solidFill>
               </a14:hiddenFill>
             </a:ext>
             <a:ext uri="{91240B29-F687-4f45-9708-019B960494DF}">
-              <a14:hiddenLine xmlns="" xmlns:a14="http://schemas.microsoft.com/office/drawing/2010/main" w="9525">
+              <a14:hiddenLine xmlns:a14="http://schemas.microsoft.com/office/drawing/2010/main" xmlns="" w="9525">
                 <a:solidFill>
                   <a:srgbClr val="000000"/>
                 </a:solidFill>
@@ -32135,8 +32113,8 @@
           </a:p>
         </p:txBody>
       </p:sp>
-      <mc:AlternateContent xmlns:mc="http://schemas.openxmlformats.org/markup-compatibility/2006">
-        <mc:Choice xmlns:a14="http://schemas.microsoft.com/office/drawing/2010/main" Requires="a14">
+      <mc:AlternateContent xmlns:mc="http://schemas.openxmlformats.org/markup-compatibility/2006" xmlns:a14="http://schemas.microsoft.com/office/drawing/2010/main">
+        <mc:Choice Requires="a14">
           <p:sp>
             <p:nvSpPr>
               <p:cNvPr id="4" name="Title 1">
@@ -32486,7 +32464,7 @@
             </p:txBody>
           </p:sp>
         </mc:Choice>
-        <mc:Fallback>
+        <mc:Fallback xmlns="">
           <p:sp>
             <p:nvSpPr>
               <p:cNvPr id="4" name="Title 1">
@@ -32937,14 +32915,14 @@
           </a:prstGeom>
           <a:extLst>
             <a:ext uri="{909E8E84-426E-40dd-AFC4-6F175D3DCCD1}">
-              <a14:hiddenFill xmlns="" xmlns:a14="http://schemas.microsoft.com/office/drawing/2010/main">
+              <a14:hiddenFill xmlns:a14="http://schemas.microsoft.com/office/drawing/2010/main" xmlns="">
                 <a:solidFill>
                   <a:srgbClr val="FFFFFF"/>
                 </a:solidFill>
               </a14:hiddenFill>
             </a:ext>
             <a:ext uri="{91240B29-F687-4f45-9708-019B960494DF}">
-              <a14:hiddenLine xmlns="" xmlns:a14="http://schemas.microsoft.com/office/drawing/2010/main" w="9525">
+              <a14:hiddenLine xmlns:a14="http://schemas.microsoft.com/office/drawing/2010/main" xmlns="" w="9525">
                 <a:solidFill>
                   <a:srgbClr val="000000"/>
                 </a:solidFill>
@@ -33619,8 +33597,8 @@
           </a:prstGeom>
         </p:spPr>
       </p:pic>
-      <mc:AlternateContent xmlns:mc="http://schemas.openxmlformats.org/markup-compatibility/2006">
-        <mc:Choice xmlns:a14="http://schemas.microsoft.com/office/drawing/2010/main" Requires="a14">
+      <mc:AlternateContent xmlns:mc="http://schemas.openxmlformats.org/markup-compatibility/2006" xmlns:a14="http://schemas.microsoft.com/office/drawing/2010/main">
+        <mc:Choice Requires="a14">
           <p:sp>
             <p:nvSpPr>
               <p:cNvPr id="8" name="TextBox 7">
@@ -33887,7 +33865,7 @@
             </p:txBody>
           </p:sp>
         </mc:Choice>
-        <mc:Fallback>
+        <mc:Fallback xmlns="">
           <p:sp>
             <p:nvSpPr>
               <p:cNvPr id="8" name="TextBox 7">
@@ -34299,14 +34277,14 @@
           </a:prstGeom>
           <a:extLst>
             <a:ext uri="{909E8E84-426E-40dd-AFC4-6F175D3DCCD1}">
-              <a14:hiddenFill xmlns="" xmlns:a14="http://schemas.microsoft.com/office/drawing/2010/main">
+              <a14:hiddenFill xmlns:a14="http://schemas.microsoft.com/office/drawing/2010/main" xmlns="">
                 <a:solidFill>
                   <a:srgbClr val="FFFFFF"/>
                 </a:solidFill>
               </a14:hiddenFill>
             </a:ext>
             <a:ext uri="{91240B29-F687-4f45-9708-019B960494DF}">
-              <a14:hiddenLine xmlns="" xmlns:a14="http://schemas.microsoft.com/office/drawing/2010/main" w="9525">
+              <a14:hiddenLine xmlns:a14="http://schemas.microsoft.com/office/drawing/2010/main" xmlns="" w="9525">
                 <a:solidFill>
                   <a:srgbClr val="000000"/>
                 </a:solidFill>

</xml_diff>

<commit_message>
Major Updates to Week 3's Practical
</commit_message>
<xml_diff>
--- a/Lecture_notes_ppt/GEOG0125 Week 2 Lecture - Bayesian GLMs.pptx
+++ b/Lecture_notes_ppt/GEOG0125 Week 2 Lecture - Bayesian GLMs.pptx
@@ -248,7 +248,7 @@
           <a:p>
             <a:fld id="{B189E245-271D-FD48-BFBB-D05CACE4EE11}" type="datetimeFigureOut">
               <a:rPr lang="en-US" smtClean="0"/>
-              <a:t>1/24/25</a:t>
+              <a:t>1/30/25</a:t>
             </a:fld>
             <a:endParaRPr lang="en-US"/>
           </a:p>
@@ -1931,7 +1931,7 @@
           <a:p>
             <a:fld id="{2BB000D9-F882-5444-9F67-E68F2BDFFFE1}" type="datetimeFigureOut">
               <a:rPr lang="en-US" smtClean="0"/>
-              <a:t>1/24/25</a:t>
+              <a:t>1/30/25</a:t>
             </a:fld>
             <a:endParaRPr lang="en-US"/>
           </a:p>
@@ -2139,7 +2139,7 @@
           <a:p>
             <a:fld id="{2BB000D9-F882-5444-9F67-E68F2BDFFFE1}" type="datetimeFigureOut">
               <a:rPr lang="en-US" smtClean="0"/>
-              <a:t>1/24/25</a:t>
+              <a:t>1/30/25</a:t>
             </a:fld>
             <a:endParaRPr lang="en-US"/>
           </a:p>
@@ -2557,7 +2557,7 @@
           <a:p>
             <a:fld id="{C21145F5-A5E9-5F43-82CD-3B9BA6E3131E}" type="datetimeFigureOut">
               <a:rPr lang="en-US" smtClean="0"/>
-              <a:t>1/24/25</a:t>
+              <a:t>1/30/25</a:t>
             </a:fld>
             <a:endParaRPr lang="en-US"/>
           </a:p>
@@ -2765,7 +2765,7 @@
           <a:p>
             <a:fld id="{C21145F5-A5E9-5F43-82CD-3B9BA6E3131E}" type="datetimeFigureOut">
               <a:rPr lang="en-US" smtClean="0"/>
-              <a:t>1/24/25</a:t>
+              <a:t>1/30/25</a:t>
             </a:fld>
             <a:endParaRPr lang="en-US"/>
           </a:p>
@@ -3040,7 +3040,7 @@
           <a:p>
             <a:fld id="{C21145F5-A5E9-5F43-82CD-3B9BA6E3131E}" type="datetimeFigureOut">
               <a:rPr lang="en-US" smtClean="0"/>
-              <a:t>1/24/25</a:t>
+              <a:t>1/30/25</a:t>
             </a:fld>
             <a:endParaRPr lang="en-US"/>
           </a:p>
@@ -3307,7 +3307,7 @@
           <a:p>
             <a:fld id="{C21145F5-A5E9-5F43-82CD-3B9BA6E3131E}" type="datetimeFigureOut">
               <a:rPr lang="en-US" smtClean="0"/>
-              <a:t>1/24/25</a:t>
+              <a:t>1/30/25</a:t>
             </a:fld>
             <a:endParaRPr lang="en-US"/>
           </a:p>
@@ -3710,7 +3710,7 @@
           <a:p>
             <a:fld id="{C21145F5-A5E9-5F43-82CD-3B9BA6E3131E}" type="datetimeFigureOut">
               <a:rPr lang="en-US" smtClean="0"/>
-              <a:t>1/24/25</a:t>
+              <a:t>1/30/25</a:t>
             </a:fld>
             <a:endParaRPr lang="en-US"/>
           </a:p>
@@ -3889,7 +3889,7 @@
           <a:p>
             <a:fld id="{C21145F5-A5E9-5F43-82CD-3B9BA6E3131E}" type="datetimeFigureOut">
               <a:rPr lang="en-US" smtClean="0"/>
-              <a:t>1/24/25</a:t>
+              <a:t>1/30/25</a:t>
             </a:fld>
             <a:endParaRPr lang="en-US"/>
           </a:p>
@@ -4008,7 +4008,7 @@
           <a:p>
             <a:fld id="{C21145F5-A5E9-5F43-82CD-3B9BA6E3131E}" type="datetimeFigureOut">
               <a:rPr lang="en-US" smtClean="0"/>
-              <a:t>1/24/25</a:t>
+              <a:t>1/30/25</a:t>
             </a:fld>
             <a:endParaRPr lang="en-US"/>
           </a:p>
@@ -4316,7 +4316,7 @@
           <a:p>
             <a:fld id="{C21145F5-A5E9-5F43-82CD-3B9BA6E3131E}" type="datetimeFigureOut">
               <a:rPr lang="en-US" smtClean="0"/>
-              <a:t>1/24/25</a:t>
+              <a:t>1/30/25</a:t>
             </a:fld>
             <a:endParaRPr lang="en-US"/>
           </a:p>
@@ -4601,7 +4601,7 @@
           <a:p>
             <a:fld id="{C21145F5-A5E9-5F43-82CD-3B9BA6E3131E}" type="datetimeFigureOut">
               <a:rPr lang="en-US" smtClean="0"/>
-              <a:t>1/24/25</a:t>
+              <a:t>1/30/25</a:t>
             </a:fld>
             <a:endParaRPr lang="en-US"/>
           </a:p>
@@ -4809,7 +4809,7 @@
           <a:p>
             <a:fld id="{C21145F5-A5E9-5F43-82CD-3B9BA6E3131E}" type="datetimeFigureOut">
               <a:rPr lang="en-US" smtClean="0"/>
-              <a:t>1/24/25</a:t>
+              <a:t>1/30/25</a:t>
             </a:fld>
             <a:endParaRPr lang="en-US"/>
           </a:p>
@@ -5017,7 +5017,7 @@
           <a:p>
             <a:fld id="{C21145F5-A5E9-5F43-82CD-3B9BA6E3131E}" type="datetimeFigureOut">
               <a:rPr lang="en-US" smtClean="0"/>
-              <a:t>1/24/25</a:t>
+              <a:t>1/30/25</a:t>
             </a:fld>
             <a:endParaRPr lang="en-US"/>
           </a:p>
@@ -5325,7 +5325,7 @@
           <a:p>
             <a:fld id="{2BB000D9-F882-5444-9F67-E68F2BDFFFE1}" type="datetimeFigureOut">
               <a:rPr lang="en-US" smtClean="0"/>
-              <a:t>1/24/25</a:t>
+              <a:t>1/30/25</a:t>
             </a:fld>
             <a:endParaRPr lang="en-US"/>
           </a:p>
@@ -5592,7 +5592,7 @@
           <a:p>
             <a:fld id="{2BB000D9-F882-5444-9F67-E68F2BDFFFE1}" type="datetimeFigureOut">
               <a:rPr lang="en-US" smtClean="0"/>
-              <a:t>1/24/25</a:t>
+              <a:t>1/30/25</a:t>
             </a:fld>
             <a:endParaRPr lang="en-US"/>
           </a:p>
@@ -5995,7 +5995,7 @@
           <a:p>
             <a:fld id="{2BB000D9-F882-5444-9F67-E68F2BDFFFE1}" type="datetimeFigureOut">
               <a:rPr lang="en-US" smtClean="0"/>
-              <a:t>1/24/25</a:t>
+              <a:t>1/30/25</a:t>
             </a:fld>
             <a:endParaRPr lang="en-US"/>
           </a:p>
@@ -6144,7 +6144,7 @@
           <a:p>
             <a:fld id="{2BB000D9-F882-5444-9F67-E68F2BDFFFE1}" type="datetimeFigureOut">
               <a:rPr lang="en-US" smtClean="0"/>
-              <a:t>1/24/25</a:t>
+              <a:t>1/30/25</a:t>
             </a:fld>
             <a:endParaRPr lang="en-US"/>
           </a:p>
@@ -6263,7 +6263,7 @@
           <a:p>
             <a:fld id="{2BB000D9-F882-5444-9F67-E68F2BDFFFE1}" type="datetimeFigureOut">
               <a:rPr lang="en-US" smtClean="0"/>
-              <a:t>1/24/25</a:t>
+              <a:t>1/30/25</a:t>
             </a:fld>
             <a:endParaRPr lang="en-US"/>
           </a:p>
@@ -6571,7 +6571,7 @@
           <a:p>
             <a:fld id="{2BB000D9-F882-5444-9F67-E68F2BDFFFE1}" type="datetimeFigureOut">
               <a:rPr lang="en-US" smtClean="0"/>
-              <a:t>1/24/25</a:t>
+              <a:t>1/30/25</a:t>
             </a:fld>
             <a:endParaRPr lang="en-US"/>
           </a:p>
@@ -6856,7 +6856,7 @@
           <a:p>
             <a:fld id="{2BB000D9-F882-5444-9F67-E68F2BDFFFE1}" type="datetimeFigureOut">
               <a:rPr lang="en-US" smtClean="0"/>
-              <a:t>1/24/25</a:t>
+              <a:t>1/30/25</a:t>
             </a:fld>
             <a:endParaRPr lang="en-US"/>
           </a:p>
@@ -8530,29 +8530,7 @@
                 <a:ea typeface="Helvetica Neue Light" panose="02000403000000020004" pitchFamily="2" charset="0"/>
                 <a:cs typeface="Calibri Light" charset="0"/>
               </a:rPr>
-              <a:t>Introduction to BAYESIAN </a:t>
-            </a:r>
-            <a:r>
-              <a:rPr lang="en-GB" sz="3200" b="1" cap="all" dirty="0" err="1">
-                <a:solidFill>
-                  <a:prstClr val="black"/>
-                </a:solidFill>
-                <a:latin typeface="Helvetica Neue Light" panose="02000403000000020004" pitchFamily="2" charset="0"/>
-                <a:ea typeface="Helvetica Neue Light" panose="02000403000000020004" pitchFamily="2" charset="0"/>
-                <a:cs typeface="Calibri Light" charset="0"/>
-              </a:rPr>
-              <a:t>GeneraliSed</a:t>
-            </a:r>
-            <a:r>
-              <a:rPr lang="en-GB" sz="3200" b="1" cap="all" dirty="0">
-                <a:solidFill>
-                  <a:prstClr val="black"/>
-                </a:solidFill>
-                <a:latin typeface="Helvetica Neue Light" panose="02000403000000020004" pitchFamily="2" charset="0"/>
-                <a:ea typeface="Helvetica Neue Light" panose="02000403000000020004" pitchFamily="2" charset="0"/>
-                <a:cs typeface="Calibri Light" charset="0"/>
-              </a:rPr>
-              <a:t> linear models (GLM)</a:t>
+              <a:t>Introduction to BAYESIAN Generalised linear models (GLM)</a:t>
             </a:r>
           </a:p>
           <a:p>
@@ -8699,14 +8677,14 @@
           </a:prstGeom>
           <a:extLst>
             <a:ext uri="{909E8E84-426E-40dd-AFC4-6F175D3DCCD1}">
-              <a14:hiddenFill xmlns:a14="http://schemas.microsoft.com/office/drawing/2010/main" xmlns="">
+              <a14:hiddenFill xmlns="" xmlns:a14="http://schemas.microsoft.com/office/drawing/2010/main">
                 <a:solidFill>
                   <a:srgbClr val="FFFFFF"/>
                 </a:solidFill>
               </a14:hiddenFill>
             </a:ext>
             <a:ext uri="{91240B29-F687-4f45-9708-019B960494DF}">
-              <a14:hiddenLine xmlns:a14="http://schemas.microsoft.com/office/drawing/2010/main" xmlns="" w="9525">
+              <a14:hiddenLine xmlns="" xmlns:a14="http://schemas.microsoft.com/office/drawing/2010/main" w="9525">
                 <a:solidFill>
                   <a:srgbClr val="000000"/>
                 </a:solidFill>
@@ -10258,14 +10236,14 @@
           </a:prstGeom>
           <a:extLst>
             <a:ext uri="{909E8E84-426E-40dd-AFC4-6F175D3DCCD1}">
-              <a14:hiddenFill xmlns:a14="http://schemas.microsoft.com/office/drawing/2010/main" xmlns="">
+              <a14:hiddenFill xmlns="" xmlns:a14="http://schemas.microsoft.com/office/drawing/2010/main">
                 <a:solidFill>
                   <a:srgbClr val="FFFFFF"/>
                 </a:solidFill>
               </a14:hiddenFill>
             </a:ext>
             <a:ext uri="{91240B29-F687-4f45-9708-019B960494DF}">
-              <a14:hiddenLine xmlns:a14="http://schemas.microsoft.com/office/drawing/2010/main" xmlns="" w="9525">
+              <a14:hiddenLine xmlns="" xmlns:a14="http://schemas.microsoft.com/office/drawing/2010/main" w="9525">
                 <a:solidFill>
                   <a:srgbClr val="000000"/>
                 </a:solidFill>
@@ -11290,14 +11268,14 @@
           </a:prstGeom>
           <a:extLst>
             <a:ext uri="{909E8E84-426E-40dd-AFC4-6F175D3DCCD1}">
-              <a14:hiddenFill xmlns:a14="http://schemas.microsoft.com/office/drawing/2010/main" xmlns="">
+              <a14:hiddenFill xmlns="" xmlns:a14="http://schemas.microsoft.com/office/drawing/2010/main">
                 <a:solidFill>
                   <a:srgbClr val="FFFFFF"/>
                 </a:solidFill>
               </a14:hiddenFill>
             </a:ext>
             <a:ext uri="{91240B29-F687-4f45-9708-019B960494DF}">
-              <a14:hiddenLine xmlns:a14="http://schemas.microsoft.com/office/drawing/2010/main" xmlns="" w="9525">
+              <a14:hiddenLine xmlns="" xmlns:a14="http://schemas.microsoft.com/office/drawing/2010/main" w="9525">
                 <a:solidFill>
                   <a:srgbClr val="000000"/>
                 </a:solidFill>
@@ -12421,14 +12399,14 @@
           </a:prstGeom>
           <a:extLst>
             <a:ext uri="{909E8E84-426E-40dd-AFC4-6F175D3DCCD1}">
-              <a14:hiddenFill xmlns:a14="http://schemas.microsoft.com/office/drawing/2010/main" xmlns="">
+              <a14:hiddenFill xmlns="" xmlns:a14="http://schemas.microsoft.com/office/drawing/2010/main">
                 <a:solidFill>
                   <a:srgbClr val="FFFFFF"/>
                 </a:solidFill>
               </a14:hiddenFill>
             </a:ext>
             <a:ext uri="{91240B29-F687-4f45-9708-019B960494DF}">
-              <a14:hiddenLine xmlns:a14="http://schemas.microsoft.com/office/drawing/2010/main" xmlns="" w="9525">
+              <a14:hiddenLine xmlns="" xmlns:a14="http://schemas.microsoft.com/office/drawing/2010/main" w="9525">
                 <a:solidFill>
                   <a:srgbClr val="000000"/>
                 </a:solidFill>
@@ -12849,14 +12827,14 @@
           </a:prstGeom>
           <a:extLst>
             <a:ext uri="{909E8E84-426E-40dd-AFC4-6F175D3DCCD1}">
-              <a14:hiddenFill xmlns:a14="http://schemas.microsoft.com/office/drawing/2010/main" xmlns="">
+              <a14:hiddenFill xmlns="" xmlns:a14="http://schemas.microsoft.com/office/drawing/2010/main">
                 <a:solidFill>
                   <a:srgbClr val="FFFFFF"/>
                 </a:solidFill>
               </a14:hiddenFill>
             </a:ext>
             <a:ext uri="{91240B29-F687-4f45-9708-019B960494DF}">
-              <a14:hiddenLine xmlns:a14="http://schemas.microsoft.com/office/drawing/2010/main" xmlns="" w="9525">
+              <a14:hiddenLine xmlns="" xmlns:a14="http://schemas.microsoft.com/office/drawing/2010/main" w="9525">
                 <a:solidFill>
                   <a:srgbClr val="000000"/>
                 </a:solidFill>
@@ -13206,14 +13184,14 @@
           </a:prstGeom>
           <a:extLst>
             <a:ext uri="{909E8E84-426E-40dd-AFC4-6F175D3DCCD1}">
-              <a14:hiddenFill xmlns:a14="http://schemas.microsoft.com/office/drawing/2010/main" xmlns="">
+              <a14:hiddenFill xmlns="" xmlns:a14="http://schemas.microsoft.com/office/drawing/2010/main">
                 <a:solidFill>
                   <a:srgbClr val="FFFFFF"/>
                 </a:solidFill>
               </a14:hiddenFill>
             </a:ext>
             <a:ext uri="{91240B29-F687-4f45-9708-019B960494DF}">
-              <a14:hiddenLine xmlns:a14="http://schemas.microsoft.com/office/drawing/2010/main" xmlns="" w="9525">
+              <a14:hiddenLine xmlns="" xmlns:a14="http://schemas.microsoft.com/office/drawing/2010/main" w="9525">
                 <a:solidFill>
                   <a:srgbClr val="000000"/>
                 </a:solidFill>
@@ -14428,14 +14406,14 @@
           </a:prstGeom>
           <a:extLst>
             <a:ext uri="{909E8E84-426E-40dd-AFC4-6F175D3DCCD1}">
-              <a14:hiddenFill xmlns:a14="http://schemas.microsoft.com/office/drawing/2010/main" xmlns="">
+              <a14:hiddenFill xmlns="" xmlns:a14="http://schemas.microsoft.com/office/drawing/2010/main">
                 <a:solidFill>
                   <a:srgbClr val="FFFFFF"/>
                 </a:solidFill>
               </a14:hiddenFill>
             </a:ext>
             <a:ext uri="{91240B29-F687-4f45-9708-019B960494DF}">
-              <a14:hiddenLine xmlns:a14="http://schemas.microsoft.com/office/drawing/2010/main" xmlns="" w="9525">
+              <a14:hiddenLine xmlns="" xmlns:a14="http://schemas.microsoft.com/office/drawing/2010/main" w="9525">
                 <a:solidFill>
                   <a:srgbClr val="000000"/>
                 </a:solidFill>
@@ -15489,14 +15467,14 @@
           </a:prstGeom>
           <a:extLst>
             <a:ext uri="{909E8E84-426E-40dd-AFC4-6F175D3DCCD1}">
-              <a14:hiddenFill xmlns:a14="http://schemas.microsoft.com/office/drawing/2010/main" xmlns="">
+              <a14:hiddenFill xmlns="" xmlns:a14="http://schemas.microsoft.com/office/drawing/2010/main">
                 <a:solidFill>
                   <a:srgbClr val="FFFFFF"/>
                 </a:solidFill>
               </a14:hiddenFill>
             </a:ext>
             <a:ext uri="{91240B29-F687-4f45-9708-019B960494DF}">
-              <a14:hiddenLine xmlns:a14="http://schemas.microsoft.com/office/drawing/2010/main" xmlns="" w="9525">
+              <a14:hiddenLine xmlns="" xmlns:a14="http://schemas.microsoft.com/office/drawing/2010/main" w="9525">
                 <a:solidFill>
                   <a:srgbClr val="000000"/>
                 </a:solidFill>
@@ -15917,14 +15895,14 @@
           </a:prstGeom>
           <a:extLst>
             <a:ext uri="{909E8E84-426E-40dd-AFC4-6F175D3DCCD1}">
-              <a14:hiddenFill xmlns:a14="http://schemas.microsoft.com/office/drawing/2010/main" xmlns="">
+              <a14:hiddenFill xmlns="" xmlns:a14="http://schemas.microsoft.com/office/drawing/2010/main">
                 <a:solidFill>
                   <a:srgbClr val="FFFFFF"/>
                 </a:solidFill>
               </a14:hiddenFill>
             </a:ext>
             <a:ext uri="{91240B29-F687-4f45-9708-019B960494DF}">
-              <a14:hiddenLine xmlns:a14="http://schemas.microsoft.com/office/drawing/2010/main" xmlns="" w="9525">
+              <a14:hiddenLine xmlns="" xmlns:a14="http://schemas.microsoft.com/office/drawing/2010/main" w="9525">
                 <a:solidFill>
                   <a:srgbClr val="000000"/>
                 </a:solidFill>
@@ -16397,14 +16375,14 @@
           </a:prstGeom>
           <a:extLst>
             <a:ext uri="{909E8E84-426E-40dd-AFC4-6F175D3DCCD1}">
-              <a14:hiddenFill xmlns:a14="http://schemas.microsoft.com/office/drawing/2010/main" xmlns="">
+              <a14:hiddenFill xmlns="" xmlns:a14="http://schemas.microsoft.com/office/drawing/2010/main">
                 <a:solidFill>
                   <a:srgbClr val="FFFFFF"/>
                 </a:solidFill>
               </a14:hiddenFill>
             </a:ext>
             <a:ext uri="{91240B29-F687-4f45-9708-019B960494DF}">
-              <a14:hiddenLine xmlns:a14="http://schemas.microsoft.com/office/drawing/2010/main" xmlns="" w="9525">
+              <a14:hiddenLine xmlns="" xmlns:a14="http://schemas.microsoft.com/office/drawing/2010/main" w="9525">
                 <a:solidFill>
                   <a:srgbClr val="000000"/>
                 </a:solidFill>
@@ -17006,14 +16984,14 @@
           </a:prstGeom>
           <a:extLst>
             <a:ext uri="{909E8E84-426E-40dd-AFC4-6F175D3DCCD1}">
-              <a14:hiddenFill xmlns:a14="http://schemas.microsoft.com/office/drawing/2010/main" xmlns="">
+              <a14:hiddenFill xmlns="" xmlns:a14="http://schemas.microsoft.com/office/drawing/2010/main">
                 <a:solidFill>
                   <a:srgbClr val="FFFFFF"/>
                 </a:solidFill>
               </a14:hiddenFill>
             </a:ext>
             <a:ext uri="{91240B29-F687-4f45-9708-019B960494DF}">
-              <a14:hiddenLine xmlns:a14="http://schemas.microsoft.com/office/drawing/2010/main" xmlns="" w="9525">
+              <a14:hiddenLine xmlns="" xmlns:a14="http://schemas.microsoft.com/office/drawing/2010/main" w="9525">
                 <a:solidFill>
                   <a:srgbClr val="000000"/>
                 </a:solidFill>
@@ -19432,14 +19410,14 @@
           </a:prstGeom>
           <a:extLst>
             <a:ext uri="{909E8E84-426E-40dd-AFC4-6F175D3DCCD1}">
-              <a14:hiddenFill xmlns:a14="http://schemas.microsoft.com/office/drawing/2010/main" xmlns="">
+              <a14:hiddenFill xmlns="" xmlns:a14="http://schemas.microsoft.com/office/drawing/2010/main">
                 <a:solidFill>
                   <a:srgbClr val="FFFFFF"/>
                 </a:solidFill>
               </a14:hiddenFill>
             </a:ext>
             <a:ext uri="{91240B29-F687-4f45-9708-019B960494DF}">
-              <a14:hiddenLine xmlns:a14="http://schemas.microsoft.com/office/drawing/2010/main" xmlns="" w="9525">
+              <a14:hiddenLine xmlns="" xmlns:a14="http://schemas.microsoft.com/office/drawing/2010/main" w="9525">
                 <a:solidFill>
                   <a:srgbClr val="000000"/>
                 </a:solidFill>
@@ -19748,14 +19726,14 @@
           </a:prstGeom>
           <a:extLst>
             <a:ext uri="{909E8E84-426E-40dd-AFC4-6F175D3DCCD1}">
-              <a14:hiddenFill xmlns:a14="http://schemas.microsoft.com/office/drawing/2010/main" xmlns="">
+              <a14:hiddenFill xmlns="" xmlns:a14="http://schemas.microsoft.com/office/drawing/2010/main">
                 <a:solidFill>
                   <a:srgbClr val="FFFFFF"/>
                 </a:solidFill>
               </a14:hiddenFill>
             </a:ext>
             <a:ext uri="{91240B29-F687-4f45-9708-019B960494DF}">
-              <a14:hiddenLine xmlns:a14="http://schemas.microsoft.com/office/drawing/2010/main" xmlns="" w="9525">
+              <a14:hiddenLine xmlns="" xmlns:a14="http://schemas.microsoft.com/office/drawing/2010/main" w="9525">
                 <a:solidFill>
                   <a:srgbClr val="000000"/>
                 </a:solidFill>
@@ -20217,14 +20195,14 @@
           </a:prstGeom>
           <a:extLst>
             <a:ext uri="{909E8E84-426E-40dd-AFC4-6F175D3DCCD1}">
-              <a14:hiddenFill xmlns:a14="http://schemas.microsoft.com/office/drawing/2010/main" xmlns="">
+              <a14:hiddenFill xmlns="" xmlns:a14="http://schemas.microsoft.com/office/drawing/2010/main">
                 <a:solidFill>
                   <a:srgbClr val="FFFFFF"/>
                 </a:solidFill>
               </a14:hiddenFill>
             </a:ext>
             <a:ext uri="{91240B29-F687-4f45-9708-019B960494DF}">
-              <a14:hiddenLine xmlns:a14="http://schemas.microsoft.com/office/drawing/2010/main" xmlns="" w="9525">
+              <a14:hiddenLine xmlns="" xmlns:a14="http://schemas.microsoft.com/office/drawing/2010/main" w="9525">
                 <a:solidFill>
                   <a:srgbClr val="000000"/>
                 </a:solidFill>
@@ -23063,14 +23041,14 @@
           </a:prstGeom>
           <a:extLst>
             <a:ext uri="{909E8E84-426E-40dd-AFC4-6F175D3DCCD1}">
-              <a14:hiddenFill xmlns:a14="http://schemas.microsoft.com/office/drawing/2010/main" xmlns="">
+              <a14:hiddenFill xmlns="" xmlns:a14="http://schemas.microsoft.com/office/drawing/2010/main">
                 <a:solidFill>
                   <a:srgbClr val="FFFFFF"/>
                 </a:solidFill>
               </a14:hiddenFill>
             </a:ext>
             <a:ext uri="{91240B29-F687-4f45-9708-019B960494DF}">
-              <a14:hiddenLine xmlns:a14="http://schemas.microsoft.com/office/drawing/2010/main" xmlns="" w="9525">
+              <a14:hiddenLine xmlns="" xmlns:a14="http://schemas.microsoft.com/office/drawing/2010/main" w="9525">
                 <a:solidFill>
                   <a:srgbClr val="000000"/>
                 </a:solidFill>
@@ -26106,14 +26084,14 @@
           </a:prstGeom>
           <a:extLst>
             <a:ext uri="{909E8E84-426E-40dd-AFC4-6F175D3DCCD1}">
-              <a14:hiddenFill xmlns:a14="http://schemas.microsoft.com/office/drawing/2010/main" xmlns="">
+              <a14:hiddenFill xmlns="" xmlns:a14="http://schemas.microsoft.com/office/drawing/2010/main">
                 <a:solidFill>
                   <a:srgbClr val="FFFFFF"/>
                 </a:solidFill>
               </a14:hiddenFill>
             </a:ext>
             <a:ext uri="{91240B29-F687-4f45-9708-019B960494DF}">
-              <a14:hiddenLine xmlns:a14="http://schemas.microsoft.com/office/drawing/2010/main" xmlns="" w="9525">
+              <a14:hiddenLine xmlns="" xmlns:a14="http://schemas.microsoft.com/office/drawing/2010/main" w="9525">
                 <a:solidFill>
                   <a:srgbClr val="000000"/>
                 </a:solidFill>
@@ -27089,14 +27067,14 @@
           </a:prstGeom>
           <a:extLst>
             <a:ext uri="{909E8E84-426E-40dd-AFC4-6F175D3DCCD1}">
-              <a14:hiddenFill xmlns:a14="http://schemas.microsoft.com/office/drawing/2010/main" xmlns="">
+              <a14:hiddenFill xmlns="" xmlns:a14="http://schemas.microsoft.com/office/drawing/2010/main">
                 <a:solidFill>
                   <a:srgbClr val="FFFFFF"/>
                 </a:solidFill>
               </a14:hiddenFill>
             </a:ext>
             <a:ext uri="{91240B29-F687-4f45-9708-019B960494DF}">
-              <a14:hiddenLine xmlns:a14="http://schemas.microsoft.com/office/drawing/2010/main" xmlns="" w="9525">
+              <a14:hiddenLine xmlns="" xmlns:a14="http://schemas.microsoft.com/office/drawing/2010/main" w="9525">
                 <a:solidFill>
                   <a:srgbClr val="000000"/>
                 </a:solidFill>
@@ -27621,14 +27599,14 @@
           </a:prstGeom>
           <a:extLst>
             <a:ext uri="{909E8E84-426E-40dd-AFC4-6F175D3DCCD1}">
-              <a14:hiddenFill xmlns:a14="http://schemas.microsoft.com/office/drawing/2010/main" xmlns="">
+              <a14:hiddenFill xmlns="" xmlns:a14="http://schemas.microsoft.com/office/drawing/2010/main">
                 <a:solidFill>
                   <a:srgbClr val="FFFFFF"/>
                 </a:solidFill>
               </a14:hiddenFill>
             </a:ext>
             <a:ext uri="{91240B29-F687-4f45-9708-019B960494DF}">
-              <a14:hiddenLine xmlns:a14="http://schemas.microsoft.com/office/drawing/2010/main" xmlns="" w="9525">
+              <a14:hiddenLine xmlns="" xmlns:a14="http://schemas.microsoft.com/office/drawing/2010/main" w="9525">
                 <a:solidFill>
                   <a:srgbClr val="000000"/>
                 </a:solidFill>
@@ -28020,14 +27998,14 @@
           </a:prstGeom>
           <a:extLst>
             <a:ext uri="{909E8E84-426E-40dd-AFC4-6F175D3DCCD1}">
-              <a14:hiddenFill xmlns:a14="http://schemas.microsoft.com/office/drawing/2010/main" xmlns="">
+              <a14:hiddenFill xmlns="" xmlns:a14="http://schemas.microsoft.com/office/drawing/2010/main">
                 <a:solidFill>
                   <a:srgbClr val="FFFFFF"/>
                 </a:solidFill>
               </a14:hiddenFill>
             </a:ext>
             <a:ext uri="{91240B29-F687-4f45-9708-019B960494DF}">
-              <a14:hiddenLine xmlns:a14="http://schemas.microsoft.com/office/drawing/2010/main" xmlns="" w="9525">
+              <a14:hiddenLine xmlns="" xmlns:a14="http://schemas.microsoft.com/office/drawing/2010/main" w="9525">
                 <a:solidFill>
                   <a:srgbClr val="000000"/>
                 </a:solidFill>
@@ -29208,14 +29186,14 @@
           </a:prstGeom>
           <a:extLst>
             <a:ext uri="{909E8E84-426E-40dd-AFC4-6F175D3DCCD1}">
-              <a14:hiddenFill xmlns:a14="http://schemas.microsoft.com/office/drawing/2010/main" xmlns="">
+              <a14:hiddenFill xmlns="" xmlns:a14="http://schemas.microsoft.com/office/drawing/2010/main">
                 <a:solidFill>
                   <a:srgbClr val="FFFFFF"/>
                 </a:solidFill>
               </a14:hiddenFill>
             </a:ext>
             <a:ext uri="{91240B29-F687-4f45-9708-019B960494DF}">
-              <a14:hiddenLine xmlns:a14="http://schemas.microsoft.com/office/drawing/2010/main" xmlns="" w="9525">
+              <a14:hiddenLine xmlns="" xmlns:a14="http://schemas.microsoft.com/office/drawing/2010/main" w="9525">
                 <a:solidFill>
                   <a:srgbClr val="000000"/>
                 </a:solidFill>
@@ -30354,14 +30332,14 @@
           </a:prstGeom>
           <a:extLst>
             <a:ext uri="{909E8E84-426E-40dd-AFC4-6F175D3DCCD1}">
-              <a14:hiddenFill xmlns:a14="http://schemas.microsoft.com/office/drawing/2010/main" xmlns="">
+              <a14:hiddenFill xmlns="" xmlns:a14="http://schemas.microsoft.com/office/drawing/2010/main">
                 <a:solidFill>
                   <a:srgbClr val="FFFFFF"/>
                 </a:solidFill>
               </a14:hiddenFill>
             </a:ext>
             <a:ext uri="{91240B29-F687-4f45-9708-019B960494DF}">
-              <a14:hiddenLine xmlns:a14="http://schemas.microsoft.com/office/drawing/2010/main" xmlns="" w="9525">
+              <a14:hiddenLine xmlns="" xmlns:a14="http://schemas.microsoft.com/office/drawing/2010/main" w="9525">
                 <a:solidFill>
                   <a:srgbClr val="000000"/>
                 </a:solidFill>
@@ -31541,14 +31519,14 @@
           </a:prstGeom>
           <a:extLst>
             <a:ext uri="{909E8E84-426E-40dd-AFC4-6F175D3DCCD1}">
-              <a14:hiddenFill xmlns:a14="http://schemas.microsoft.com/office/drawing/2010/main" xmlns="">
+              <a14:hiddenFill xmlns="" xmlns:a14="http://schemas.microsoft.com/office/drawing/2010/main">
                 <a:solidFill>
                   <a:srgbClr val="FFFFFF"/>
                 </a:solidFill>
               </a14:hiddenFill>
             </a:ext>
             <a:ext uri="{91240B29-F687-4f45-9708-019B960494DF}">
-              <a14:hiddenLine xmlns:a14="http://schemas.microsoft.com/office/drawing/2010/main" xmlns="" w="9525">
+              <a14:hiddenLine xmlns="" xmlns:a14="http://schemas.microsoft.com/office/drawing/2010/main" w="9525">
                 <a:solidFill>
                   <a:srgbClr val="000000"/>
                 </a:solidFill>
@@ -31871,14 +31849,14 @@
           </a:prstGeom>
           <a:extLst>
             <a:ext uri="{909E8E84-426E-40dd-AFC4-6F175D3DCCD1}">
-              <a14:hiddenFill xmlns:a14="http://schemas.microsoft.com/office/drawing/2010/main" xmlns="">
+              <a14:hiddenFill xmlns="" xmlns:a14="http://schemas.microsoft.com/office/drawing/2010/main">
                 <a:solidFill>
                   <a:srgbClr val="FFFFFF"/>
                 </a:solidFill>
               </a14:hiddenFill>
             </a:ext>
             <a:ext uri="{91240B29-F687-4f45-9708-019B960494DF}">
-              <a14:hiddenLine xmlns:a14="http://schemas.microsoft.com/office/drawing/2010/main" xmlns="" w="9525">
+              <a14:hiddenLine xmlns="" xmlns:a14="http://schemas.microsoft.com/office/drawing/2010/main" w="9525">
                 <a:solidFill>
                   <a:srgbClr val="000000"/>
                 </a:solidFill>
@@ -32915,14 +32893,14 @@
           </a:prstGeom>
           <a:extLst>
             <a:ext uri="{909E8E84-426E-40dd-AFC4-6F175D3DCCD1}">
-              <a14:hiddenFill xmlns:a14="http://schemas.microsoft.com/office/drawing/2010/main" xmlns="">
+              <a14:hiddenFill xmlns="" xmlns:a14="http://schemas.microsoft.com/office/drawing/2010/main">
                 <a:solidFill>
                   <a:srgbClr val="FFFFFF"/>
                 </a:solidFill>
               </a14:hiddenFill>
             </a:ext>
             <a:ext uri="{91240B29-F687-4f45-9708-019B960494DF}">
-              <a14:hiddenLine xmlns:a14="http://schemas.microsoft.com/office/drawing/2010/main" xmlns="" w="9525">
+              <a14:hiddenLine xmlns="" xmlns:a14="http://schemas.microsoft.com/office/drawing/2010/main" w="9525">
                 <a:solidFill>
                   <a:srgbClr val="000000"/>
                 </a:solidFill>
@@ -34277,14 +34255,14 @@
           </a:prstGeom>
           <a:extLst>
             <a:ext uri="{909E8E84-426E-40dd-AFC4-6F175D3DCCD1}">
-              <a14:hiddenFill xmlns:a14="http://schemas.microsoft.com/office/drawing/2010/main" xmlns="">
+              <a14:hiddenFill xmlns="" xmlns:a14="http://schemas.microsoft.com/office/drawing/2010/main">
                 <a:solidFill>
                   <a:srgbClr val="FFFFFF"/>
                 </a:solidFill>
               </a14:hiddenFill>
             </a:ext>
             <a:ext uri="{91240B29-F687-4f45-9708-019B960494DF}">
-              <a14:hiddenLine xmlns:a14="http://schemas.microsoft.com/office/drawing/2010/main" xmlns="" w="9525">
+              <a14:hiddenLine xmlns="" xmlns:a14="http://schemas.microsoft.com/office/drawing/2010/main" w="9525">
                 <a:solidFill>
                   <a:srgbClr val="000000"/>
                 </a:solidFill>

</xml_diff>